<commit_message>
update presentation, sum to prod in formulas
</commit_message>
<xml_diff>
--- a/presentation/presentation.pptx
+++ b/presentation/presentation.pptx
@@ -390,7 +390,7 @@
           <a:p>
             <a:fld id="{4BDF68E2-58F2-4D09-BE8B-E3BD06533059}" type="datetimeFigureOut">
               <a:rPr lang="en-US" smtClean="0"/>
-              <a:t>5/1/16</a:t>
+              <a:t>5/2/2016</a:t>
             </a:fld>
             <a:endParaRPr lang="en-US" dirty="0"/>
           </a:p>
@@ -598,7 +598,7 @@
           <a:p>
             <a:fld id="{2E2D6473-DF6D-4702-B328-E0DD40540A4E}" type="datetimeFigureOut">
               <a:rPr lang="en-US" smtClean="0"/>
-              <a:t>5/1/16</a:t>
+              <a:t>5/2/2016</a:t>
             </a:fld>
             <a:endParaRPr lang="en-US" dirty="0"/>
           </a:p>
@@ -854,7 +854,7 @@
           <a:p>
             <a:fld id="{E26F7E3A-B166-407D-9866-32884E7D5B37}" type="datetimeFigureOut">
               <a:rPr lang="en-US" smtClean="0"/>
-              <a:t>5/1/16</a:t>
+              <a:t>5/2/2016</a:t>
             </a:fld>
             <a:endParaRPr lang="en-US" dirty="0"/>
           </a:p>
@@ -1028,7 +1028,7 @@
           <a:p>
             <a:fld id="{528FC5F6-F338-4AE4-BB23-26385BCFC423}" type="datetimeFigureOut">
               <a:rPr lang="en-US" smtClean="0"/>
-              <a:t>5/1/16</a:t>
+              <a:t>5/2/2016</a:t>
             </a:fld>
             <a:endParaRPr lang="en-US" dirty="0"/>
           </a:p>
@@ -1371,7 +1371,7 @@
           <a:p>
             <a:fld id="{20EBB0C4-6273-4C6E-B9BD-2EDC30F1CD52}" type="datetimeFigureOut">
               <a:rPr lang="en-US" smtClean="0"/>
-              <a:t>5/1/16</a:t>
+              <a:t>5/2/2016</a:t>
             </a:fld>
             <a:endParaRPr lang="en-US" dirty="0"/>
           </a:p>
@@ -1646,7 +1646,7 @@
           <a:p>
             <a:fld id="{19AB4D41-86C1-4908-B66A-0B50CEB3BF29}" type="datetimeFigureOut">
               <a:rPr lang="en-US" smtClean="0"/>
-              <a:t>5/1/16</a:t>
+              <a:t>5/2/2016</a:t>
             </a:fld>
             <a:endParaRPr lang="en-US" dirty="0"/>
           </a:p>
@@ -2025,7 +2025,7 @@
           <a:p>
             <a:fld id="{E6426E2C-56C1-4E0D-A793-0088A7FDD37E}" type="datetimeFigureOut">
               <a:rPr lang="en-US" smtClean="0"/>
-              <a:t>5/1/16</a:t>
+              <a:t>5/2/2016</a:t>
             </a:fld>
             <a:endParaRPr lang="en-US" dirty="0"/>
           </a:p>
@@ -2143,7 +2143,7 @@
           <a:p>
             <a:fld id="{C8C39B41-D8B5-4052-B551-9B5525EAA8B6}" type="datetimeFigureOut">
               <a:rPr lang="en-US" smtClean="0"/>
-              <a:t>5/1/16</a:t>
+              <a:t>5/2/2016</a:t>
             </a:fld>
             <a:endParaRPr lang="en-US" dirty="0"/>
           </a:p>
@@ -2314,7 +2314,7 @@
           <a:p>
             <a:fld id="{4D94136C-8742-45B2-AF27-D93DF72833A9}" type="datetimeFigureOut">
               <a:rPr lang="en-US" smtClean="0"/>
-              <a:t>5/1/16</a:t>
+              <a:t>5/2/2016</a:t>
             </a:fld>
             <a:endParaRPr lang="en-US" dirty="0"/>
           </a:p>
@@ -2669,7 +2669,7 @@
           <a:p>
             <a:fld id="{32ABBEA6-7C60-4B02-AE87-00D78D8422AF}" type="datetimeFigureOut">
               <a:rPr lang="en-US" smtClean="0"/>
-              <a:t>5/1/16</a:t>
+              <a:t>5/2/2016</a:t>
             </a:fld>
             <a:endParaRPr lang="en-US" dirty="0"/>
           </a:p>
@@ -3052,7 +3052,7 @@
           <a:p>
             <a:fld id="{C9CAD897-D46E-4AD2-BD9B-49DD3E640873}" type="datetimeFigureOut">
               <a:rPr lang="en-US" smtClean="0"/>
-              <a:t>5/1/16</a:t>
+              <a:t>5/2/2016</a:t>
             </a:fld>
             <a:endParaRPr lang="en-US" dirty="0"/>
           </a:p>
@@ -3339,7 +3339,7 @@
           <a:p>
             <a:fld id="{98624D31-43A5-475A-80CF-332C9F6DCF35}" type="datetimeFigureOut">
               <a:rPr lang="en-US" smtClean="0"/>
-              <a:t>5/1/16</a:t>
+              <a:t>5/2/2016</a:t>
             </a:fld>
             <a:endParaRPr lang="en-US" dirty="0"/>
           </a:p>
@@ -4050,8 +4050,8 @@
           </a:p>
         </p:txBody>
       </p:sp>
-      <mc:AlternateContent xmlns:mc="http://schemas.openxmlformats.org/markup-compatibility/2006" xmlns:a14="http://schemas.microsoft.com/office/drawing/2010/main">
-        <mc:Choice Requires="a14">
+      <mc:AlternateContent xmlns:mc="http://schemas.openxmlformats.org/markup-compatibility/2006">
+        <mc:Choice xmlns:a14="http://schemas.microsoft.com/office/drawing/2010/main" Requires="a14">
           <p:sp>
             <p:nvSpPr>
               <p:cNvPr id="4" name="Rectangle 3"/>
@@ -4061,7 +4061,7 @@
             <p:spPr>
               <a:xfrm>
                 <a:off x="1097280" y="2811612"/>
-                <a:ext cx="10058400" cy="848758"/>
+                <a:ext cx="10058400" cy="848502"/>
               </a:xfrm>
               <a:prstGeom prst="rect">
                 <a:avLst/>
@@ -4090,7 +4090,7 @@
                         <m:dPr>
                           <m:ctrlPr>
                             <a:rPr lang="en-GB" i="1">
-                              <a:latin typeface="Cambria Math" charset="0"/>
+                              <a:latin typeface="Cambria Math" panose="02040503050406030204" pitchFamily="18" charset="0"/>
                             </a:rPr>
                           </m:ctrlPr>
                         </m:dPr>
@@ -4149,7 +4149,7 @@
                         <m:dPr>
                           <m:ctrlPr>
                             <a:rPr lang="en-GB" i="1">
-                              <a:latin typeface="Cambria Math" charset="0"/>
+                              <a:latin typeface="Cambria Math" panose="02040503050406030204" pitchFamily="18" charset="0"/>
                             </a:rPr>
                           </m:ctrlPr>
                         </m:dPr>
@@ -4188,31 +4188,34 @@
                       </m:r>
                       <m:nary>
                         <m:naryPr>
-                          <m:chr m:val="∑"/>
+                          <m:chr m:val="∏"/>
                           <m:ctrlPr>
-                            <a:rPr lang="is-IS" i="1" smtClean="0">
-                              <a:latin typeface="Cambria Math" charset="0"/>
+                            <a:rPr lang="is-IS" i="1">
+                              <a:latin typeface="Cambria Math" panose="02040503050406030204" pitchFamily="18" charset="0"/>
                             </a:rPr>
                           </m:ctrlPr>
                         </m:naryPr>
                         <m:sub>
                           <m:r>
-                            <a:rPr lang="is-IS" i="1" smtClean="0">
-                              <a:latin typeface="Cambria Math" charset="0"/>
+                            <m:rPr>
+                              <m:brk m:alnAt="23"/>
+                            </m:rPr>
+                            <a:rPr lang="sv-SE" i="1">
+                              <a:latin typeface="Cambria Math" panose="02040503050406030204" pitchFamily="18" charset="0"/>
                             </a:rPr>
                             <m:t>𝑘</m:t>
                           </m:r>
                           <m:r>
-                            <a:rPr lang="is-IS" i="1" smtClean="0">
-                              <a:latin typeface="Cambria Math" charset="0"/>
+                            <a:rPr lang="sv-SE" i="1">
+                              <a:latin typeface="Cambria Math" panose="02040503050406030204" pitchFamily="18" charset="0"/>
                             </a:rPr>
                             <m:t>=1</m:t>
                           </m:r>
                         </m:sub>
                         <m:sup>
                           <m:r>
-                            <a:rPr lang="is-IS" i="1" smtClean="0">
-                              <a:latin typeface="Cambria Math" charset="0"/>
+                            <a:rPr lang="sv-SE" i="1">
+                              <a:latin typeface="Cambria Math" panose="02040503050406030204" pitchFamily="18" charset="0"/>
                             </a:rPr>
                             <m:t>𝑛</m:t>
                           </m:r>
@@ -4221,14 +4224,14 @@
                           <m:sSub>
                             <m:sSubPr>
                               <m:ctrlPr>
-                                <a:rPr lang="en-US" b="0" i="1" smtClean="0">
-                                  <a:latin typeface="Cambria Math" charset="0"/>
+                                <a:rPr lang="en-US" i="1">
+                                  <a:latin typeface="Cambria Math" panose="02040503050406030204" pitchFamily="18" charset="0"/>
                                 </a:rPr>
                               </m:ctrlPr>
                             </m:sSubPr>
                             <m:e>
                               <m:r>
-                                <a:rPr lang="en-GB" b="0" i="1" smtClean="0">
+                                <a:rPr lang="en-GB" i="1">
                                   <a:latin typeface="Cambria Math" charset="0"/>
                                 </a:rPr>
                                 <m:t>𝑃</m:t>
@@ -4236,7 +4239,7 @@
                             </m:e>
                             <m:sub>
                               <m:r>
-                                <a:rPr lang="en-GB" b="0" i="1" smtClean="0">
+                                <a:rPr lang="en-GB" i="1">
                                   <a:latin typeface="Cambria Math" charset="0"/>
                                 </a:rPr>
                                 <m:t>𝑘</m:t>
@@ -4244,22 +4247,22 @@
                             </m:sub>
                           </m:sSub>
                           <m:r>
-                            <a:rPr lang="en-GB" b="0" i="1" smtClean="0">
+                            <a:rPr lang="en-GB" i="1">
                               <a:latin typeface="Cambria Math" charset="0"/>
                             </a:rPr>
                             <m:t>(</m:t>
                           </m:r>
                           <m:r>
-                            <a:rPr lang="en-GB" b="0" i="1" smtClean="0">
+                            <a:rPr lang="en-GB" i="1">
                               <a:latin typeface="Cambria Math" charset="0"/>
                             </a:rPr>
                             <m:t>𝑓𝑎𝑖𝑙𝑢𝑟𝑒</m:t>
                           </m:r>
                           <m:r>
-                            <a:rPr lang="en-GB" b="0" i="1" smtClean="0">
+                            <a:rPr lang="en-GB" i="1">
                               <a:latin typeface="Cambria Math" charset="0"/>
                             </a:rPr>
-                            <m:t>) </m:t>
+                            <m:t>)</m:t>
                           </m:r>
                         </m:e>
                       </m:nary>
@@ -4271,7 +4274,7 @@
             </p:txBody>
           </p:sp>
         </mc:Choice>
-        <mc:Fallback xmlns="">
+        <mc:Fallback>
           <p:sp>
             <p:nvSpPr>
               <p:cNvPr id="4" name="Rectangle 3"/>
@@ -4283,7 +4286,7 @@
             <p:spPr>
               <a:xfrm>
                 <a:off x="1097280" y="2811612"/>
-                <a:ext cx="10058400" cy="848758"/>
+                <a:ext cx="10058400" cy="848502"/>
               </a:xfrm>
               <a:prstGeom prst="rect">
                 <a:avLst/>
@@ -4300,7 +4303,7 @@
               <a:lstStyle/>
               <a:p>
                 <a:r>
-                  <a:rPr lang="en-US">
+                  <a:rPr lang="sv-SE">
                     <a:noFill/>
                   </a:rPr>
                   <a:t> </a:t>
@@ -4401,13 +4404,8 @@
             </a:pPr>
             <a:r>
               <a:rPr lang="en-US" dirty="0" smtClean="0"/>
-              <a:t>Failures must be detected and new replicas be </a:t>
-            </a:r>
-            <a:r>
-              <a:rPr lang="en-US" dirty="0" smtClean="0"/>
-              <a:t>created to fulfill the desired reliability</a:t>
-            </a:r>
-            <a:endParaRPr lang="en-US" dirty="0" smtClean="0"/>
+              <a:t>Failures must be detected and new replicas be created to fulfill the desired reliability</a:t>
+            </a:r>
           </a:p>
           <a:p>
             <a:pPr lvl="0">
@@ -4416,19 +4414,7 @@
             </a:pPr>
             <a:r>
               <a:rPr lang="en-US" dirty="0" smtClean="0"/>
-              <a:t>In order to create a new replica, at </a:t>
-            </a:r>
-            <a:r>
-              <a:rPr lang="en-US" dirty="0" smtClean="0"/>
-              <a:t>least one </a:t>
-            </a:r>
-            <a:r>
-              <a:rPr lang="en-US" dirty="0" smtClean="0"/>
-              <a:t>existing replica </a:t>
-            </a:r>
-            <a:r>
-              <a:rPr lang="en-US" dirty="0" smtClean="0"/>
-              <a:t>must be alive during the time it takes to replicate it</a:t>
+              <a:t>In order to create a new replica, at least one existing replica must be alive during the time it takes to replicate it</a:t>
             </a:r>
           </a:p>
           <a:p>
@@ -4551,11 +4537,7 @@
           <a:p>
             <a:r>
               <a:rPr lang="en-US" dirty="0" smtClean="0"/>
-              <a:t>Reliability </a:t>
-            </a:r>
-            <a:r>
-              <a:rPr lang="en-US" dirty="0" smtClean="0"/>
-              <a:t>model cont’d</a:t>
+              <a:t>Reliability model cont’d</a:t>
             </a:r>
             <a:endParaRPr lang="en-US" dirty="0"/>
           </a:p>
@@ -4595,7 +4577,7 @@
             <p:spPr>
               <a:xfrm>
                 <a:off x="1097280" y="2811612"/>
-                <a:ext cx="10058400" cy="1119153"/>
+                <a:ext cx="10058400" cy="1125501"/>
               </a:xfrm>
               <a:prstGeom prst="rect">
                 <a:avLst/>
@@ -4636,7 +4618,7 @@
                         <m:dPr>
                           <m:ctrlPr>
                             <a:rPr lang="en-GB" i="1">
-                              <a:latin typeface="Cambria Math" charset="0"/>
+                              <a:latin typeface="Cambria Math" panose="02040503050406030204" pitchFamily="18" charset="0"/>
                             </a:rPr>
                           </m:ctrlPr>
                         </m:dPr>
@@ -4731,7 +4713,7 @@
                         <m:dPr>
                           <m:ctrlPr>
                             <a:rPr lang="en-GB" i="1">
-                              <a:latin typeface="Cambria Math" charset="0"/>
+                              <a:latin typeface="Cambria Math" panose="02040503050406030204" pitchFamily="18" charset="0"/>
                             </a:rPr>
                           </m:ctrlPr>
                         </m:dPr>
@@ -4792,45 +4774,61 @@
                           </m:r>
                         </m:e>
                       </m:d>
+                    </m:oMath>
+                  </m:oMathPara>
+                </a14:m>
+                <a:endParaRPr lang="en-GB" dirty="0" smtClean="0"/>
+              </a:p>
+              <a:p>
+                <a:pPr lvl="0"/>
+                <a14:m>
+                  <m:oMathPara xmlns:m="http://schemas.openxmlformats.org/officeDocument/2006/math">
+                    <m:oMathParaPr>
+                      <m:jc m:val="centerGroup"/>
+                    </m:oMathParaPr>
+                    <m:oMath xmlns:m="http://schemas.openxmlformats.org/officeDocument/2006/math">
                       <m:r>
                         <a:rPr lang="en-GB" i="1">
                           <a:latin typeface="Cambria Math" charset="0"/>
                         </a:rPr>
-                        <m:t>=</m:t>
+                        <m:t>=1</m:t>
                       </m:r>
                       <m:r>
-                        <a:rPr lang="en-GB" b="0" i="1" smtClean="0">
-                          <a:latin typeface="Cambria Math" charset="0"/>
+                        <a:rPr lang="sv-SE" b="0" i="0" smtClean="0">
+                          <a:latin typeface="Cambria Math" panose="02040503050406030204" pitchFamily="18" charset="0"/>
                         </a:rPr>
-                        <m:t>1−</m:t>
+                        <m:t> −</m:t>
                       </m:r>
                       <m:nary>
                         <m:naryPr>
-                          <m:chr m:val="∑"/>
+                          <m:chr m:val="∏"/>
                           <m:ctrlPr>
-                            <a:rPr lang="is-IS" i="1" smtClean="0">
-                              <a:latin typeface="Cambria Math" charset="0"/>
+                            <a:rPr lang="is-IS" i="1">
+                              <a:latin typeface="Cambria Math" panose="02040503050406030204" pitchFamily="18" charset="0"/>
                             </a:rPr>
                           </m:ctrlPr>
                         </m:naryPr>
                         <m:sub>
                           <m:r>
-                            <a:rPr lang="is-IS" i="1" smtClean="0">
-                              <a:latin typeface="Cambria Math" charset="0"/>
+                            <m:rPr>
+                              <m:brk m:alnAt="23"/>
+                            </m:rPr>
+                            <a:rPr lang="sv-SE" i="1">
+                              <a:latin typeface="Cambria Math" panose="02040503050406030204" pitchFamily="18" charset="0"/>
                             </a:rPr>
                             <m:t>𝑘</m:t>
                           </m:r>
                           <m:r>
-                            <a:rPr lang="is-IS" i="1" smtClean="0">
-                              <a:latin typeface="Cambria Math" charset="0"/>
+                            <a:rPr lang="sv-SE" i="1">
+                              <a:latin typeface="Cambria Math" panose="02040503050406030204" pitchFamily="18" charset="0"/>
                             </a:rPr>
                             <m:t>=1</m:t>
                           </m:r>
                         </m:sub>
                         <m:sup>
                           <m:r>
-                            <a:rPr lang="is-IS" i="1" smtClean="0">
-                              <a:latin typeface="Cambria Math" charset="0"/>
+                            <a:rPr lang="sv-SE" i="1">
+                              <a:latin typeface="Cambria Math" panose="02040503050406030204" pitchFamily="18" charset="0"/>
                             </a:rPr>
                             <m:t>𝑛</m:t>
                           </m:r>
@@ -4839,14 +4837,14 @@
                           <m:sSub>
                             <m:sSubPr>
                               <m:ctrlPr>
-                                <a:rPr lang="en-US" b="0" i="1" smtClean="0">
-                                  <a:latin typeface="Cambria Math" charset="0"/>
+                                <a:rPr lang="en-US" i="1">
+                                  <a:latin typeface="Cambria Math" panose="02040503050406030204" pitchFamily="18" charset="0"/>
                                 </a:rPr>
                               </m:ctrlPr>
                             </m:sSubPr>
                             <m:e>
                               <m:r>
-                                <a:rPr lang="en-GB" b="0" i="1" smtClean="0">
+                                <a:rPr lang="en-GB" i="1">
                                   <a:latin typeface="Cambria Math" charset="0"/>
                                 </a:rPr>
                                 <m:t>𝑃</m:t>
@@ -4854,7 +4852,7 @@
                             </m:e>
                             <m:sub>
                               <m:r>
-                                <a:rPr lang="en-GB" b="0" i="1" smtClean="0">
+                                <a:rPr lang="en-GB" i="1">
                                   <a:latin typeface="Cambria Math" charset="0"/>
                                 </a:rPr>
                                 <m:t>𝑘</m:t>
@@ -4864,233 +4862,233 @@
                           <m:d>
                             <m:dPr>
                               <m:ctrlPr>
-                                <a:rPr lang="en-GB" b="0" i="1" smtClean="0">
+                                <a:rPr lang="en-GB" i="1">
                                   <a:latin typeface="Cambria Math" charset="0"/>
                                 </a:rPr>
                               </m:ctrlPr>
                             </m:dPr>
                             <m:e>
                               <m:r>
-                                <a:rPr lang="en-GB" b="0" i="1" smtClean="0">
+                                <a:rPr lang="en-GB" i="1">
                                   <a:latin typeface="Cambria Math" charset="0"/>
                                 </a:rPr>
                                 <m:t>𝑓𝑎𝑖𝑙𝑢𝑟𝑒</m:t>
                               </m:r>
                             </m:e>
                           </m:d>
+                        </m:e>
+                      </m:nary>
+                      <m:r>
+                        <a:rPr lang="sv-SE" b="0" i="0" smtClean="0">
+                          <a:latin typeface="Cambria Math" panose="02040503050406030204" pitchFamily="18" charset="0"/>
+                        </a:rPr>
+                        <m:t>=1 −</m:t>
+                      </m:r>
+                      <m:nary>
+                        <m:naryPr>
+                          <m:chr m:val="∏"/>
+                          <m:ctrlPr>
+                            <a:rPr lang="is-IS" i="1">
+                              <a:latin typeface="Cambria Math" panose="02040503050406030204" pitchFamily="18" charset="0"/>
+                            </a:rPr>
+                          </m:ctrlPr>
+                        </m:naryPr>
+                        <m:sub>
                           <m:r>
-                            <a:rPr lang="en-GB" i="1">
-                              <a:latin typeface="Cambria Math" charset="0"/>
+                            <m:rPr>
+                              <m:brk m:alnAt="23"/>
+                            </m:rPr>
+                            <a:rPr lang="sv-SE" i="1">
+                              <a:latin typeface="Cambria Math" panose="02040503050406030204" pitchFamily="18" charset="0"/>
                             </a:rPr>
-                            <m:t>=1−</m:t>
+                            <m:t>𝑘</m:t>
                           </m:r>
-                          <m:nary>
-                            <m:naryPr>
-                              <m:chr m:val="∑"/>
+                          <m:r>
+                            <a:rPr lang="sv-SE" i="1">
+                              <a:latin typeface="Cambria Math" panose="02040503050406030204" pitchFamily="18" charset="0"/>
+                            </a:rPr>
+                            <m:t>=1</m:t>
+                          </m:r>
+                        </m:sub>
+                        <m:sup>
+                          <m:r>
+                            <a:rPr lang="sv-SE" i="1">
+                              <a:latin typeface="Cambria Math" panose="02040503050406030204" pitchFamily="18" charset="0"/>
+                            </a:rPr>
+                            <m:t>𝑛</m:t>
+                          </m:r>
+                        </m:sup>
+                        <m:e>
+                          <m:r>
+                            <a:rPr lang="sv-SE" b="0" i="1" smtClean="0">
+                              <a:latin typeface="Cambria Math" panose="02040503050406030204" pitchFamily="18" charset="0"/>
+                            </a:rPr>
+                            <m:t>1 − </m:t>
+                          </m:r>
+                          <m:sSub>
+                            <m:sSubPr>
                               <m:ctrlPr>
-                                <a:rPr lang="is-IS" i="1">
+                                <a:rPr lang="en-US" i="1">
+                                  <a:latin typeface="Cambria Math" panose="02040503050406030204" pitchFamily="18" charset="0"/>
+                                </a:rPr>
+                              </m:ctrlPr>
+                            </m:sSubPr>
+                            <m:e>
+                              <m:r>
+                                <a:rPr lang="en-GB" i="1">
                                   <a:latin typeface="Cambria Math" charset="0"/>
                                 </a:rPr>
-                              </m:ctrlPr>
-                            </m:naryPr>
+                                <m:t>𝑃</m:t>
+                              </m:r>
+                            </m:e>
                             <m:sub>
                               <m:r>
-                                <a:rPr lang="is-IS" i="1">
+                                <a:rPr lang="en-GB" i="1">
                                   <a:latin typeface="Cambria Math" charset="0"/>
                                 </a:rPr>
                                 <m:t>𝑘</m:t>
                               </m:r>
-                              <m:r>
-                                <a:rPr lang="is-IS" i="1">
+                            </m:sub>
+                          </m:sSub>
+                          <m:d>
+                            <m:dPr>
+                              <m:ctrlPr>
+                                <a:rPr lang="en-GB" i="1">
                                   <a:latin typeface="Cambria Math" charset="0"/>
                                 </a:rPr>
-                                <m:t>=1</m:t>
+                              </m:ctrlPr>
+                            </m:dPr>
+                            <m:e>
+                              <m:r>
+                                <a:rPr lang="sv-SE" b="0" i="1" smtClean="0">
+                                  <a:latin typeface="Cambria Math" panose="02040503050406030204" pitchFamily="18" charset="0"/>
+                                </a:rPr>
+                                <m:t>𝑠</m:t>
                               </m:r>
-                            </m:sub>
-                            <m:sup>
                               <m:r>
-                                <a:rPr lang="is-IS" i="1">
-                                  <a:latin typeface="Cambria Math" charset="0"/>
+                                <a:rPr lang="sv-SE" b="0" i="1" smtClean="0">
+                                  <a:latin typeface="Cambria Math" panose="02040503050406030204" pitchFamily="18" charset="0"/>
                                 </a:rPr>
-                                <m:t>𝑛</m:t>
+                                <m:t>𝑢𝑟𝑣𝑖𝑣𝑎𝑙</m:t>
                               </m:r>
-                            </m:sup>
-                            <m:e>
-                              <m:sSub>
-                                <m:sSubPr>
-                                  <m:ctrlPr>
-                                    <a:rPr lang="en-US" i="1">
-                                      <a:latin typeface="Cambria Math" charset="0"/>
-                                    </a:rPr>
-                                  </m:ctrlPr>
-                                </m:sSubPr>
-                                <m:e>
-                                  <m:r>
-                                    <a:rPr lang="en-GB" b="0" i="1" smtClean="0">
-                                      <a:latin typeface="Cambria Math" charset="0"/>
-                                    </a:rPr>
-                                    <m:t>1−</m:t>
-                                  </m:r>
-                                  <m:r>
-                                    <a:rPr lang="en-GB" i="1">
-                                      <a:latin typeface="Cambria Math" charset="0"/>
-                                    </a:rPr>
-                                    <m:t>𝑃</m:t>
-                                  </m:r>
-                                </m:e>
-                                <m:sub>
-                                  <m:r>
-                                    <a:rPr lang="en-GB" i="1">
-                                      <a:latin typeface="Cambria Math" charset="0"/>
-                                    </a:rPr>
-                                    <m:t>𝑘</m:t>
-                                  </m:r>
-                                </m:sub>
-                              </m:sSub>
-                              <m:d>
-                                <m:dPr>
-                                  <m:ctrlPr>
-                                    <a:rPr lang="en-GB" i="1">
-                                      <a:latin typeface="Cambria Math" charset="0"/>
-                                    </a:rPr>
-                                  </m:ctrlPr>
-                                </m:dPr>
-                                <m:e>
-                                  <m:r>
-                                    <a:rPr lang="en-GB" b="0" i="1" smtClean="0">
-                                      <a:latin typeface="Cambria Math" charset="0"/>
-                                    </a:rPr>
-                                    <m:t>𝑠𝑢𝑟𝑣𝑖𝑣𝑎𝑙</m:t>
-                                  </m:r>
-                                </m:e>
-                              </m:d>
                             </m:e>
-                          </m:nary>
+                          </m:d>
+                        </m:e>
+                      </m:nary>
+                      <m:r>
+                        <a:rPr lang="sv-SE" b="0" i="0" smtClean="0">
+                          <a:latin typeface="Cambria Math" panose="02040503050406030204" pitchFamily="18" charset="0"/>
+                        </a:rPr>
+                        <m:t>=1 −</m:t>
+                      </m:r>
+                      <m:nary>
+                        <m:naryPr>
+                          <m:chr m:val="∏"/>
+                          <m:ctrlPr>
+                            <a:rPr lang="is-IS" i="1">
+                              <a:latin typeface="Cambria Math" panose="02040503050406030204" pitchFamily="18" charset="0"/>
+                            </a:rPr>
+                          </m:ctrlPr>
+                        </m:naryPr>
+                        <m:sub>
                           <m:r>
-                            <a:rPr lang="en-GB" b="0" i="1" smtClean="0">
-                              <a:latin typeface="Cambria Math" charset="0"/>
+                            <m:rPr>
+                              <m:brk m:alnAt="23"/>
+                            </m:rPr>
+                            <a:rPr lang="sv-SE" i="1">
+                              <a:latin typeface="Cambria Math" panose="02040503050406030204" pitchFamily="18" charset="0"/>
                             </a:rPr>
-                            <m:t>=</m:t>
+                            <m:t>𝑘</m:t>
                           </m:r>
+                          <m:r>
+                            <a:rPr lang="sv-SE" i="1">
+                              <a:latin typeface="Cambria Math" panose="02040503050406030204" pitchFamily="18" charset="0"/>
+                            </a:rPr>
+                            <m:t>=1</m:t>
+                          </m:r>
+                        </m:sub>
+                        <m:sup>
+                          <m:r>
+                            <a:rPr lang="sv-SE" i="1">
+                              <a:latin typeface="Cambria Math" panose="02040503050406030204" pitchFamily="18" charset="0"/>
+                            </a:rPr>
+                            <m:t>𝑛</m:t>
+                          </m:r>
+                        </m:sup>
+                        <m:e>
                           <m:r>
                             <a:rPr lang="en-GB" i="1">
                               <a:latin typeface="Cambria Math" charset="0"/>
                             </a:rPr>
                             <m:t>1−</m:t>
                           </m:r>
-                          <m:nary>
-                            <m:naryPr>
-                              <m:chr m:val="∑"/>
+                          <m:sSup>
+                            <m:sSupPr>
                               <m:ctrlPr>
                                 <a:rPr lang="is-IS" i="1">
+                                  <a:latin typeface="Cambria Math" panose="02040503050406030204" pitchFamily="18" charset="0"/>
+                                </a:rPr>
+                              </m:ctrlPr>
+                            </m:sSupPr>
+                            <m:e>
+                              <m:r>
+                                <a:rPr lang="en-GB" i="1">
                                   <a:latin typeface="Cambria Math" charset="0"/>
                                 </a:rPr>
-                              </m:ctrlPr>
-                            </m:naryPr>
-                            <m:sub>
-                              <m:r>
-                                <a:rPr lang="is-IS" i="1">
-                                  <a:latin typeface="Cambria Math" charset="0"/>
-                                </a:rPr>
-                                <m:t>𝑘</m:t>
+                                <m:t>𝑒</m:t>
                               </m:r>
-                              <m:r>
-                                <a:rPr lang="is-IS" i="1">
-                                  <a:latin typeface="Cambria Math" charset="0"/>
-                                </a:rPr>
-                                <m:t>=1</m:t>
-                              </m:r>
-                            </m:sub>
+                            </m:e>
                             <m:sup>
                               <m:r>
-                                <a:rPr lang="is-IS" i="1">
-                                  <a:latin typeface="Cambria Math" charset="0"/>
-                                </a:rPr>
-                                <m:t>𝑛</m:t>
-                              </m:r>
-                            </m:sup>
-                            <m:e>
-                              <m:r>
-                                <a:rPr lang="en-GB" i="1" smtClean="0">
-                                  <a:latin typeface="Cambria Math" charset="0"/>
-                                </a:rPr>
-                                <m:t>1</m:t>
-                              </m:r>
-                              <m:r>
-                                <a:rPr lang="en-GB" b="0" i="1" smtClean="0">
+                                <a:rPr lang="en-GB" i="1">
                                   <a:latin typeface="Cambria Math" charset="0"/>
                                 </a:rPr>
                                 <m:t>−</m:t>
                               </m:r>
-                              <m:sSup>
-                                <m:sSupPr>
+                              <m:d>
+                                <m:dPr>
                                   <m:ctrlPr>
-                                    <a:rPr lang="is-IS" i="1">
-                                      <a:latin typeface="Cambria Math" charset="0"/>
+                                    <a:rPr lang="en-US" i="1">
+                                      <a:latin typeface="Cambria Math" panose="02040503050406030204" pitchFamily="18" charset="0"/>
                                     </a:rPr>
                                   </m:ctrlPr>
-                                </m:sSupPr>
+                                </m:dPr>
                                 <m:e>
-                                  <m:r>
-                                    <a:rPr lang="en-GB" i="1">
-                                      <a:latin typeface="Cambria Math" charset="0"/>
-                                    </a:rPr>
-                                    <m:t>𝑒</m:t>
-                                  </m:r>
-                                </m:e>
-                                <m:sup>
-                                  <m:r>
-                                    <a:rPr lang="en-GB" i="1">
-                                      <a:latin typeface="Cambria Math" charset="0"/>
-                                    </a:rPr>
-                                    <m:t>−</m:t>
-                                  </m:r>
-                                  <m:d>
-                                    <m:dPr>
+                                  <m:f>
+                                    <m:fPr>
                                       <m:ctrlPr>
-                                        <a:rPr lang="en-US" i="1">
+                                        <a:rPr lang="fi-FI" i="1">
+                                          <a:latin typeface="Cambria Math" panose="02040503050406030204" pitchFamily="18" charset="0"/>
+                                        </a:rPr>
+                                      </m:ctrlPr>
+                                    </m:fPr>
+                                    <m:num>
+                                      <m:r>
+                                        <a:rPr lang="en-GB" i="1">
                                           <a:latin typeface="Cambria Math" charset="0"/>
                                         </a:rPr>
-                                      </m:ctrlPr>
-                                    </m:dPr>
-                                    <m:e>
-                                      <m:f>
-                                        <m:fPr>
-                                          <m:ctrlPr>
-                                            <a:rPr lang="fi-FI" i="1">
-                                              <a:latin typeface="Cambria Math" charset="0"/>
-                                            </a:rPr>
-                                          </m:ctrlPr>
-                                        </m:fPr>
-                                        <m:num>
-                                          <m:r>
-                                            <a:rPr lang="en-GB" i="1">
-                                              <a:latin typeface="Cambria Math" charset="0"/>
-                                            </a:rPr>
-                                            <m:t>𝑡</m:t>
-                                          </m:r>
-                                        </m:num>
-                                        <m:den>
-                                          <m:r>
-                                            <a:rPr lang="en-GB" i="1">
-                                              <a:latin typeface="Cambria Math" charset="0"/>
-                                            </a:rPr>
-                                            <m:t>𝑀𝑇𝐵𝐹</m:t>
-                                          </m:r>
-                                        </m:den>
-                                      </m:f>
-                                    </m:e>
-                                  </m:d>
-                                </m:sup>
-                              </m:sSup>
-                            </m:e>
-                          </m:nary>
+                                        <m:t>𝑡</m:t>
+                                      </m:r>
+                                    </m:num>
+                                    <m:den>
+                                      <m:r>
+                                        <a:rPr lang="en-GB" i="1">
+                                          <a:latin typeface="Cambria Math" charset="0"/>
+                                        </a:rPr>
+                                        <m:t>𝑀𝑇𝐵𝐹</m:t>
+                                      </m:r>
+                                    </m:den>
+                                  </m:f>
+                                </m:e>
+                              </m:d>
+                            </m:sup>
+                          </m:sSup>
                         </m:e>
                       </m:nary>
                     </m:oMath>
                   </m:oMathPara>
                 </a14:m>
-                <a:endParaRPr lang="en-US" dirty="0"/>
+                <a:endParaRPr lang="en-GB" dirty="0" smtClean="0"/>
               </a:p>
             </p:txBody>
           </p:sp>
@@ -5107,7 +5105,7 @@
             <p:spPr>
               <a:xfrm>
                 <a:off x="1097280" y="2811612"/>
-                <a:ext cx="10058400" cy="1119153"/>
+                <a:ext cx="10058400" cy="1125501"/>
               </a:xfrm>
               <a:prstGeom prst="rect">
                 <a:avLst/>
@@ -5115,7 +5113,7 @@
               <a:blipFill rotWithShape="0">
                 <a:blip r:embed="rId2"/>
                 <a:stretch>
-                  <a:fillRect t="-30978"/>
+                  <a:fillRect/>
                 </a:stretch>
               </a:blipFill>
             </p:spPr>
@@ -5124,7 +5122,7 @@
               <a:lstStyle/>
               <a:p>
                 <a:r>
-                  <a:rPr lang="en-US">
+                  <a:rPr lang="sv-SE">
                     <a:noFill/>
                   </a:rPr>
                   <a:t> </a:t>
@@ -7717,24 +7715,17 @@
             </a:pPr>
             <a:r>
               <a:rPr lang="en-US" dirty="0" smtClean="0"/>
-              <a:t>Fan-in/fan-out model – allowing </a:t>
-            </a:r>
-            <a:r>
-              <a:rPr lang="en-US" b="1" dirty="0" smtClean="0"/>
-              <a:t>multiple</a:t>
-            </a:r>
-            <a:r>
-              <a:rPr lang="en-US" dirty="0" smtClean="0"/>
-              <a:t> connections for an </a:t>
-            </a:r>
-            <a:r>
-              <a:rPr lang="en-US" b="1" dirty="0" err="1" smtClean="0"/>
-              <a:t>outport</a:t>
-            </a:r>
-            <a:r>
-              <a:rPr lang="en-US" b="1" dirty="0" smtClean="0"/>
-              <a:t> TODO (in or out?)</a:t>
-            </a:r>
+              <a:t>Fan-in/fan-out model – allowing multiple connections for an </a:t>
+            </a:r>
+            <a:r>
+              <a:rPr lang="en-US" dirty="0" err="1" smtClean="0"/>
+              <a:t>in</a:t>
+            </a:r>
+            <a:r>
+              <a:rPr lang="en-US" dirty="0" err="1" smtClean="0"/>
+              <a:t>port</a:t>
+            </a:r>
+            <a:endParaRPr lang="en-US" dirty="0" smtClean="0"/>
           </a:p>
           <a:p>
             <a:pPr>
@@ -7753,7 +7744,11 @@
             </a:pPr>
             <a:r>
               <a:rPr lang="en-US" dirty="0" smtClean="0"/>
-              <a:t>Listens for heartbeats</a:t>
+              <a:t>Listens </a:t>
+            </a:r>
+            <a:r>
+              <a:rPr lang="en-US" dirty="0" smtClean="0"/>
+              <a:t>for heartbeats</a:t>
             </a:r>
           </a:p>
           <a:p>
@@ -13939,7 +13934,15 @@
             </a:pPr>
             <a:r>
               <a:rPr lang="en-US" dirty="0" smtClean="0"/>
-              <a:t>We assume a interconnected set of computing resources (nodes), providing redundant paths and interconnectivity between all nodes.</a:t>
+              <a:t>We assume </a:t>
+            </a:r>
+            <a:r>
+              <a:rPr lang="en-US" dirty="0" smtClean="0"/>
+              <a:t>an interconnected </a:t>
+            </a:r>
+            <a:r>
+              <a:rPr lang="en-US" dirty="0" smtClean="0"/>
+              <a:t>set of computing resources (nodes), providing redundant paths and interconnectivity between all nodes.</a:t>
             </a:r>
           </a:p>
           <a:p>
@@ -14407,7 +14410,7 @@
                         <m:dPr>
                           <m:ctrlPr>
                             <a:rPr lang="en-GB" i="1">
-                              <a:latin typeface="Cambria Math" charset="0"/>
+                              <a:latin typeface="Cambria Math" panose="02040503050406030204" pitchFamily="18" charset="0"/>
                             </a:rPr>
                           </m:ctrlPr>
                         </m:dPr>
@@ -14442,7 +14445,7 @@
                         <m:fPr>
                           <m:ctrlPr>
                             <a:rPr lang="fi-FI" i="1">
-                              <a:latin typeface="Cambria Math" charset="0"/>
+                              <a:latin typeface="Cambria Math" panose="02040503050406030204" pitchFamily="18" charset="0"/>
                             </a:rPr>
                           </m:ctrlPr>
                         </m:fPr>
@@ -14463,7 +14466,7 @@
                             <m:sSupPr>
                               <m:ctrlPr>
                                 <a:rPr lang="is-IS" i="1">
-                                  <a:latin typeface="Cambria Math" charset="0"/>
+                                  <a:latin typeface="Cambria Math" panose="02040503050406030204" pitchFamily="18" charset="0"/>
                                 </a:rPr>
                               </m:ctrlPr>
                             </m:sSupPr>
@@ -14599,7 +14602,7 @@
                         <m:fPr>
                           <m:ctrlPr>
                             <a:rPr lang="fi-FI" i="1">
-                              <a:latin typeface="Cambria Math" charset="0"/>
+                              <a:latin typeface="Cambria Math" panose="02040503050406030204" pitchFamily="18" charset="0"/>
                             </a:rPr>
                           </m:ctrlPr>
                         </m:fPr>
@@ -14707,7 +14710,7 @@
                         <m:dPr>
                           <m:ctrlPr>
                             <a:rPr lang="en-GB" i="1">
-                              <a:latin typeface="Cambria Math" charset="0"/>
+                              <a:latin typeface="Cambria Math" panose="02040503050406030204" pitchFamily="18" charset="0"/>
                             </a:rPr>
                           </m:ctrlPr>
                         </m:dPr>
@@ -14778,7 +14781,7 @@
                         <m:fPr>
                           <m:ctrlPr>
                             <a:rPr lang="fi-FI" i="1">
-                              <a:latin typeface="Cambria Math" charset="0"/>
+                              <a:latin typeface="Cambria Math" panose="02040503050406030204" pitchFamily="18" charset="0"/>
                             </a:rPr>
                           </m:ctrlPr>
                         </m:fPr>
@@ -14787,7 +14790,7 @@
                             <m:sSupPr>
                               <m:ctrlPr>
                                 <a:rPr lang="is-IS" i="1">
-                                  <a:latin typeface="Cambria Math" charset="0"/>
+                                  <a:latin typeface="Cambria Math" panose="02040503050406030204" pitchFamily="18" charset="0"/>
                                 </a:rPr>
                               </m:ctrlPr>
                             </m:sSupPr>
@@ -14796,7 +14799,7 @@
                                 <m:dPr>
                                   <m:ctrlPr>
                                     <a:rPr lang="en-US" i="1">
-                                      <a:latin typeface="Cambria Math" charset="0"/>
+                                      <a:latin typeface="Cambria Math" panose="02040503050406030204" pitchFamily="18" charset="0"/>
                                     </a:rPr>
                                   </m:ctrlPr>
                                 </m:dPr>
@@ -14805,7 +14808,7 @@
                                     <m:fPr>
                                       <m:ctrlPr>
                                         <a:rPr lang="fi-FI" i="1">
-                                          <a:latin typeface="Cambria Math" charset="0"/>
+                                          <a:latin typeface="Cambria Math" panose="02040503050406030204" pitchFamily="18" charset="0"/>
                                         </a:rPr>
                                       </m:ctrlPr>
                                     </m:fPr>
@@ -14848,7 +14851,7 @@
                             <m:sSupPr>
                               <m:ctrlPr>
                                 <a:rPr lang="is-IS" i="1">
-                                  <a:latin typeface="Cambria Math" charset="0"/>
+                                  <a:latin typeface="Cambria Math" panose="02040503050406030204" pitchFamily="18" charset="0"/>
                                 </a:rPr>
                               </m:ctrlPr>
                             </m:sSupPr>
@@ -14871,7 +14874,7 @@
                                 <m:dPr>
                                   <m:ctrlPr>
                                     <a:rPr lang="en-US" i="1">
-                                      <a:latin typeface="Cambria Math" charset="0"/>
+                                      <a:latin typeface="Cambria Math" panose="02040503050406030204" pitchFamily="18" charset="0"/>
                                     </a:rPr>
                                   </m:ctrlPr>
                                 </m:dPr>
@@ -14880,7 +14883,7 @@
                                     <m:fPr>
                                       <m:ctrlPr>
                                         <a:rPr lang="fi-FI" i="1">
-                                          <a:latin typeface="Cambria Math" charset="0"/>
+                                          <a:latin typeface="Cambria Math" panose="02040503050406030204" pitchFamily="18" charset="0"/>
                                         </a:rPr>
                                       </m:ctrlPr>
                                     </m:fPr>
@@ -15170,7 +15173,7 @@
                         <m:dPr>
                           <m:ctrlPr>
                             <a:rPr lang="en-GB" i="1">
-                              <a:latin typeface="Cambria Math" charset="0"/>
+                              <a:latin typeface="Cambria Math" panose="02040503050406030204" pitchFamily="18" charset="0"/>
                             </a:rPr>
                           </m:ctrlPr>
                         </m:dPr>
@@ -15199,7 +15202,7 @@
                         <m:dPr>
                           <m:ctrlPr>
                             <a:rPr lang="en-GB" i="1">
-                              <a:latin typeface="Cambria Math" charset="0"/>
+                              <a:latin typeface="Cambria Math" panose="02040503050406030204" pitchFamily="18" charset="0"/>
                             </a:rPr>
                           </m:ctrlPr>
                         </m:dPr>
@@ -15264,7 +15267,7 @@
                         <m:fPr>
                           <m:ctrlPr>
                             <a:rPr lang="fi-FI" i="1">
-                              <a:latin typeface="Cambria Math" charset="0"/>
+                              <a:latin typeface="Cambria Math" panose="02040503050406030204" pitchFamily="18" charset="0"/>
                             </a:rPr>
                           </m:ctrlPr>
                         </m:fPr>
@@ -15273,7 +15276,7 @@
                             <m:sSupPr>
                               <m:ctrlPr>
                                 <a:rPr lang="is-IS" i="1">
-                                  <a:latin typeface="Cambria Math" charset="0"/>
+                                  <a:latin typeface="Cambria Math" panose="02040503050406030204" pitchFamily="18" charset="0"/>
                                 </a:rPr>
                               </m:ctrlPr>
                             </m:sSupPr>
@@ -15282,7 +15285,7 @@
                                 <m:dPr>
                                   <m:ctrlPr>
                                     <a:rPr lang="en-US" i="1">
-                                      <a:latin typeface="Cambria Math" charset="0"/>
+                                      <a:latin typeface="Cambria Math" panose="02040503050406030204" pitchFamily="18" charset="0"/>
                                     </a:rPr>
                                   </m:ctrlPr>
                                 </m:dPr>
@@ -15291,7 +15294,7 @@
                                     <m:fPr>
                                       <m:ctrlPr>
                                         <a:rPr lang="fi-FI" i="1">
-                                          <a:latin typeface="Cambria Math" charset="0"/>
+                                          <a:latin typeface="Cambria Math" panose="02040503050406030204" pitchFamily="18" charset="0"/>
                                         </a:rPr>
                                       </m:ctrlPr>
                                     </m:fPr>
@@ -15334,7 +15337,7 @@
                             <m:sSupPr>
                               <m:ctrlPr>
                                 <a:rPr lang="is-IS" i="1">
-                                  <a:latin typeface="Cambria Math" charset="0"/>
+                                  <a:latin typeface="Cambria Math" panose="02040503050406030204" pitchFamily="18" charset="0"/>
                                 </a:rPr>
                               </m:ctrlPr>
                             </m:sSupPr>
@@ -15357,7 +15360,7 @@
                                 <m:dPr>
                                   <m:ctrlPr>
                                     <a:rPr lang="en-US" i="1">
-                                      <a:latin typeface="Cambria Math" charset="0"/>
+                                      <a:latin typeface="Cambria Math" panose="02040503050406030204" pitchFamily="18" charset="0"/>
                                     </a:rPr>
                                   </m:ctrlPr>
                                 </m:dPr>
@@ -15366,7 +15369,7 @@
                                     <m:fPr>
                                       <m:ctrlPr>
                                         <a:rPr lang="fi-FI" i="1">
-                                          <a:latin typeface="Cambria Math" charset="0"/>
+                                          <a:latin typeface="Cambria Math" panose="02040503050406030204" pitchFamily="18" charset="0"/>
                                         </a:rPr>
                                       </m:ctrlPr>
                                     </m:fPr>
@@ -15417,7 +15420,7 @@
                         <m:sSupPr>
                           <m:ctrlPr>
                             <a:rPr lang="is-IS" i="1">
-                              <a:latin typeface="Cambria Math" charset="0"/>
+                              <a:latin typeface="Cambria Math" panose="02040503050406030204" pitchFamily="18" charset="0"/>
                             </a:rPr>
                           </m:ctrlPr>
                         </m:sSupPr>
@@ -15440,7 +15443,7 @@
                             <m:dPr>
                               <m:ctrlPr>
                                 <a:rPr lang="en-US" i="1">
-                                  <a:latin typeface="Cambria Math" charset="0"/>
+                                  <a:latin typeface="Cambria Math" panose="02040503050406030204" pitchFamily="18" charset="0"/>
                                 </a:rPr>
                               </m:ctrlPr>
                             </m:dPr>
@@ -15449,7 +15452,7 @@
                                 <m:fPr>
                                   <m:ctrlPr>
                                     <a:rPr lang="fi-FI" i="1">
-                                      <a:latin typeface="Cambria Math" charset="0"/>
+                                      <a:latin typeface="Cambria Math" panose="02040503050406030204" pitchFamily="18" charset="0"/>
                                     </a:rPr>
                                   </m:ctrlPr>
                                 </m:fPr>
@@ -15561,7 +15564,7 @@
                         <m:dPr>
                           <m:ctrlPr>
                             <a:rPr lang="en-GB" i="1">
-                              <a:latin typeface="Cambria Math" charset="0"/>
+                              <a:latin typeface="Cambria Math" panose="02040503050406030204" pitchFamily="18" charset="0"/>
                             </a:rPr>
                           </m:ctrlPr>
                         </m:dPr>
@@ -15632,7 +15635,7 @@
                         <m:fPr>
                           <m:ctrlPr>
                             <a:rPr lang="fi-FI" i="1">
-                              <a:latin typeface="Cambria Math" charset="0"/>
+                              <a:latin typeface="Cambria Math" panose="02040503050406030204" pitchFamily="18" charset="0"/>
                             </a:rPr>
                           </m:ctrlPr>
                         </m:fPr>
@@ -15641,7 +15644,7 @@
                             <m:sSupPr>
                               <m:ctrlPr>
                                 <a:rPr lang="is-IS" i="1">
-                                  <a:latin typeface="Cambria Math" charset="0"/>
+                                  <a:latin typeface="Cambria Math" panose="02040503050406030204" pitchFamily="18" charset="0"/>
                                 </a:rPr>
                               </m:ctrlPr>
                             </m:sSupPr>
@@ -15650,7 +15653,7 @@
                                 <m:dPr>
                                   <m:ctrlPr>
                                     <a:rPr lang="en-US" i="1">
-                                      <a:latin typeface="Cambria Math" charset="0"/>
+                                      <a:latin typeface="Cambria Math" panose="02040503050406030204" pitchFamily="18" charset="0"/>
                                     </a:rPr>
                                   </m:ctrlPr>
                                 </m:dPr>
@@ -15659,7 +15662,7 @@
                                     <m:fPr>
                                       <m:ctrlPr>
                                         <a:rPr lang="fi-FI" i="1">
-                                          <a:latin typeface="Cambria Math" charset="0"/>
+                                          <a:latin typeface="Cambria Math" panose="02040503050406030204" pitchFamily="18" charset="0"/>
                                         </a:rPr>
                                       </m:ctrlPr>
                                     </m:fPr>
@@ -15702,7 +15705,7 @@
                             <m:sSupPr>
                               <m:ctrlPr>
                                 <a:rPr lang="is-IS" i="1">
-                                  <a:latin typeface="Cambria Math" charset="0"/>
+                                  <a:latin typeface="Cambria Math" panose="02040503050406030204" pitchFamily="18" charset="0"/>
                                 </a:rPr>
                               </m:ctrlPr>
                             </m:sSupPr>
@@ -15725,7 +15728,7 @@
                                 <m:dPr>
                                   <m:ctrlPr>
                                     <a:rPr lang="en-US" i="1">
-                                      <a:latin typeface="Cambria Math" charset="0"/>
+                                      <a:latin typeface="Cambria Math" panose="02040503050406030204" pitchFamily="18" charset="0"/>
                                     </a:rPr>
                                   </m:ctrlPr>
                                 </m:dPr>
@@ -15734,7 +15737,7 @@
                                     <m:fPr>
                                       <m:ctrlPr>
                                         <a:rPr lang="fi-FI" i="1">
-                                          <a:latin typeface="Cambria Math" charset="0"/>
+                                          <a:latin typeface="Cambria Math" panose="02040503050406030204" pitchFamily="18" charset="0"/>
                                         </a:rPr>
                                       </m:ctrlPr>
                                     </m:fPr>
@@ -15862,7 +15865,7 @@
                         <m:dPr>
                           <m:ctrlPr>
                             <a:rPr lang="en-GB" i="1">
-                              <a:latin typeface="Cambria Math" charset="0"/>
+                              <a:latin typeface="Cambria Math" panose="02040503050406030204" pitchFamily="18" charset="0"/>
                             </a:rPr>
                           </m:ctrlPr>
                         </m:dPr>

</xml_diff>

<commit_message>
Added to future work
</commit_message>
<xml_diff>
--- a/presentation/presentation.pptx
+++ b/presentation/presentation.pptx
@@ -58,6 +58,7 @@
     <p:sldId id="279" r:id="rId52"/>
     <p:sldId id="280" r:id="rId53"/>
     <p:sldId id="281" r:id="rId54"/>
+    <p:sldId id="324" r:id="rId55"/>
   </p:sldIdLst>
   <p:sldSz cx="12192000" cy="6858000"/>
   <p:notesSz cx="6858000" cy="9144000"/>
@@ -4394,11 +4395,7 @@
             </a:pPr>
             <a:r>
               <a:rPr lang="en-US" dirty="0" smtClean="0"/>
-              <a:t> Failures </a:t>
-            </a:r>
-            <a:r>
-              <a:rPr lang="en-US" dirty="0" smtClean="0"/>
-              <a:t>will happen</a:t>
+              <a:t> Failures will happen</a:t>
             </a:r>
           </a:p>
           <a:p>
@@ -4408,11 +4405,7 @@
             </a:pPr>
             <a:r>
               <a:rPr lang="en-US" dirty="0" smtClean="0"/>
-              <a:t> Failures </a:t>
-            </a:r>
-            <a:r>
-              <a:rPr lang="en-US" dirty="0" smtClean="0"/>
-              <a:t>must be detected and new replicas be created to fulfill the desired reliability</a:t>
+              <a:t> Failures must be detected and new replicas be created to fulfill the desired reliability</a:t>
             </a:r>
           </a:p>
           <a:p>
@@ -4422,11 +4415,7 @@
             </a:pPr>
             <a:r>
               <a:rPr lang="en-US" dirty="0" smtClean="0"/>
-              <a:t> In </a:t>
-            </a:r>
-            <a:r>
-              <a:rPr lang="en-US" dirty="0" smtClean="0"/>
-              <a:t>order to create a new replica, at least one existing replica must be alive during the time it takes to replicate it</a:t>
+              <a:t> In order to create a new replica, at least one existing replica must be alive during the time it takes to replicate it</a:t>
             </a:r>
           </a:p>
           <a:p>
@@ -4436,11 +4425,7 @@
             </a:pPr>
             <a:r>
               <a:rPr lang="en-US" dirty="0" smtClean="0"/>
-              <a:t> The </a:t>
-            </a:r>
-            <a:r>
-              <a:rPr lang="en-US" dirty="0" smtClean="0"/>
-              <a:t>reliability can therefore be expressed as </a:t>
+              <a:t> The reliability can therefore be expressed as </a:t>
             </a:r>
             <a:r>
               <a:rPr lang="en-US" i="1" dirty="0"/>
@@ -4452,15 +4437,7 @@
             </a:r>
             <a:r>
               <a:rPr lang="is-IS" i="1" dirty="0" smtClean="0"/>
-              <a:t>running during a </a:t>
-            </a:r>
-            <a:r>
-              <a:rPr lang="is-IS" i="1" dirty="0" smtClean="0"/>
-              <a:t>time </a:t>
-            </a:r>
-            <a:r>
-              <a:rPr lang="is-IS" i="1" dirty="0" smtClean="0"/>
-              <a:t>t...”</a:t>
+              <a:t>running during a time t...”</a:t>
             </a:r>
             <a:r>
               <a:rPr lang="is-IS" dirty="0" smtClean="0"/>
@@ -4486,11 +4463,7 @@
             </a:pPr>
             <a:r>
               <a:rPr lang="is-IS" dirty="0" smtClean="0"/>
-              <a:t> The </a:t>
-            </a:r>
-            <a:r>
-              <a:rPr lang="is-IS" dirty="0" smtClean="0"/>
-              <a:t>time </a:t>
+              <a:t> The time </a:t>
             </a:r>
             <a:r>
               <a:rPr lang="is-IS" i="1" dirty="0" smtClean="0"/>
@@ -5253,11 +5226,7 @@
             </a:pPr>
             <a:r>
               <a:rPr lang="en-US" dirty="0" smtClean="0"/>
-              <a:t>Create </a:t>
-            </a:r>
-            <a:r>
-              <a:rPr lang="en-US" dirty="0" smtClean="0"/>
-              <a:t>enough replicas to reach the required reliability</a:t>
+              <a:t>Create enough replicas to reach the required reliability</a:t>
             </a:r>
           </a:p>
           <a:p>
@@ -5267,13 +5236,8 @@
             </a:pPr>
             <a:r>
               <a:rPr lang="en-US" dirty="0" smtClean="0"/>
-              <a:t>Detect failures and create new replicas if </a:t>
-            </a:r>
-            <a:r>
-              <a:rPr lang="en-US" dirty="0" smtClean="0"/>
-              <a:t>needed</a:t>
-            </a:r>
-            <a:endParaRPr lang="en-US" dirty="0" smtClean="0"/>
+              <a:t>Detect failures and create new replicas if needed</a:t>
+            </a:r>
           </a:p>
           <a:p>
             <a:pPr lvl="1">
@@ -5610,11 +5574,7 @@
             </a:pPr>
             <a:r>
               <a:rPr lang="en-US" dirty="0" smtClean="0"/>
-              <a:t>Heartbeats </a:t>
-            </a:r>
-            <a:r>
-              <a:rPr lang="en-US" dirty="0" smtClean="0"/>
-              <a:t>are periodically sent between runtimes. If no heartbeat from a node is received within 500 </a:t>
+              <a:t>Heartbeats are periodically sent between runtimes. If no heartbeat from a node is received within 500 </a:t>
             </a:r>
             <a:r>
               <a:rPr lang="en-US" dirty="0" err="1" smtClean="0"/>
@@ -5622,11 +5582,7 @@
             </a:r>
             <a:r>
               <a:rPr lang="en-US" dirty="0" smtClean="0"/>
-              <a:t>, it is assumed </a:t>
-            </a:r>
-            <a:r>
-              <a:rPr lang="en-US" dirty="0" smtClean="0"/>
-              <a:t>dead.</a:t>
+              <a:t>, it is assumed dead.</a:t>
             </a:r>
           </a:p>
           <a:p>
@@ -5647,11 +5603,7 @@
             </a:pPr>
             <a:r>
               <a:rPr lang="en-US" dirty="0" smtClean="0"/>
-              <a:t>Frequency</a:t>
-            </a:r>
-            <a:r>
-              <a:rPr lang="en-US" dirty="0" smtClean="0"/>
-              <a:t>: 200 </a:t>
+              <a:t>Frequency: 200 </a:t>
             </a:r>
             <a:r>
               <a:rPr lang="en-US" dirty="0" err="1" smtClean="0"/>
@@ -5677,11 +5629,7 @@
             </a:pPr>
             <a:r>
               <a:rPr lang="en-US" dirty="0" smtClean="0"/>
-              <a:t>Timeout</a:t>
-            </a:r>
-            <a:r>
-              <a:rPr lang="en-US" dirty="0" smtClean="0"/>
-              <a:t>: 500 </a:t>
+              <a:t>Timeout: 500 </a:t>
             </a:r>
             <a:r>
               <a:rPr lang="en-US" dirty="0" err="1" smtClean="0"/>
@@ -6120,19 +6068,7 @@
             </a:pPr>
             <a:r>
               <a:rPr lang="en-US" dirty="0" smtClean="0"/>
-              <a:t>If </a:t>
-            </a:r>
-            <a:r>
-              <a:rPr lang="en-US" dirty="0" smtClean="0"/>
-              <a:t>no </a:t>
-            </a:r>
-            <a:r>
-              <a:rPr lang="en-US" dirty="0" smtClean="0"/>
-              <a:t>reply is received - start over at </a:t>
-            </a:r>
-            <a:r>
-              <a:rPr lang="en-US" dirty="0" smtClean="0"/>
-              <a:t>1</a:t>
+              <a:t>If no reply is received - start over at 1</a:t>
             </a:r>
           </a:p>
           <a:p>
@@ -6146,11 +6082,7 @@
             </a:r>
             <a:r>
               <a:rPr lang="en-US" dirty="0" smtClean="0"/>
-              <a:t>f </a:t>
-            </a:r>
-            <a:r>
-              <a:rPr lang="en-US" dirty="0" smtClean="0"/>
-              <a:t>reply – we’re done</a:t>
+              <a:t>f reply – we’re done</a:t>
             </a:r>
           </a:p>
           <a:p>
@@ -7036,11 +6968,7 @@
             </a:pPr>
             <a:r>
               <a:rPr lang="en-US" dirty="0" smtClean="0"/>
-              <a:t> Calvin </a:t>
-            </a:r>
-            <a:r>
-              <a:rPr lang="en-US" dirty="0" smtClean="0"/>
-              <a:t>is an actor-based application environment for light-weight </a:t>
+              <a:t> Calvin is an actor-based application environment for light-weight </a:t>
             </a:r>
             <a:r>
               <a:rPr lang="en-US" dirty="0" err="1" smtClean="0"/>
@@ -7050,7 +6978,6 @@
               <a:rPr lang="en-US" dirty="0" smtClean="0"/>
               <a:t> applications. Its key components are </a:t>
             </a:r>
-            <a:endParaRPr lang="en-US" dirty="0" smtClean="0"/>
           </a:p>
           <a:p>
             <a:pPr lvl="1">
@@ -7097,11 +7024,7 @@
             </a:pPr>
             <a:r>
               <a:rPr lang="en-US" dirty="0" smtClean="0"/>
-              <a:t>and </a:t>
-            </a:r>
-            <a:r>
-              <a:rPr lang="en-US" dirty="0" smtClean="0"/>
-              <a:t>the use of </a:t>
+              <a:t>and the use of </a:t>
             </a:r>
             <a:r>
               <a:rPr lang="en-US" dirty="0" err="1" smtClean="0"/>
@@ -7195,11 +7118,7 @@
             </a:pPr>
             <a:r>
               <a:rPr lang="en-US" dirty="0" smtClean="0"/>
-              <a:t> A </a:t>
-            </a:r>
-            <a:r>
-              <a:rPr lang="en-US" dirty="0" smtClean="0"/>
-              <a:t>Calvin runtime </a:t>
+              <a:t> A Calvin runtime </a:t>
             </a:r>
             <a:r>
               <a:rPr lang="en-US" dirty="0"/>
@@ -7217,11 +7136,7 @@
             </a:pPr>
             <a:r>
               <a:rPr lang="en-US" dirty="0" smtClean="0"/>
-              <a:t> P</a:t>
-            </a:r>
-            <a:r>
-              <a:rPr lang="en-US" dirty="0" smtClean="0"/>
-              <a:t>rovides </a:t>
+              <a:t> Provides </a:t>
             </a:r>
             <a:r>
               <a:rPr lang="en-US" dirty="0"/>
@@ -7324,15 +7239,7 @@
             </a:pPr>
             <a:r>
               <a:rPr lang="en-US" dirty="0" smtClean="0"/>
-              <a:t> An </a:t>
-            </a:r>
-            <a:r>
-              <a:rPr lang="en-US" dirty="0" smtClean="0"/>
-              <a:t>actor in Calvin consists of ports, actions, and preconditions under which actions can </a:t>
-            </a:r>
-            <a:r>
-              <a:rPr lang="en-US" dirty="0" smtClean="0"/>
-              <a:t>fire.</a:t>
+              <a:t> An actor in Calvin consists of ports, actions, and preconditions under which actions can fire.</a:t>
             </a:r>
           </a:p>
           <a:p>
@@ -7346,15 +7253,7 @@
             </a:r>
             <a:r>
               <a:rPr lang="en-US" dirty="0" smtClean="0"/>
-              <a:t>For </a:t>
-            </a:r>
-            <a:r>
-              <a:rPr lang="en-US" dirty="0" smtClean="0"/>
-              <a:t>each in-port there is a queue of messages, called tokens, to process. Each out-port has a queue of tokens to send to another actors </a:t>
-            </a:r>
-            <a:r>
-              <a:rPr lang="en-US" dirty="0" smtClean="0"/>
-              <a:t>in-port.</a:t>
+              <a:t>For each in-port there is a queue of messages, called tokens, to process. Each out-port has a queue of tokens to send to another actors in-port.</a:t>
             </a:r>
           </a:p>
           <a:p>
@@ -7368,19 +7267,7 @@
             </a:r>
             <a:r>
               <a:rPr lang="en-US" dirty="0" smtClean="0"/>
-              <a:t>The </a:t>
-            </a:r>
-            <a:r>
-              <a:rPr lang="en-US" dirty="0" smtClean="0"/>
-              <a:t>state of an actor is used when </a:t>
-            </a:r>
-            <a:r>
-              <a:rPr lang="en-US" dirty="0" smtClean="0"/>
-              <a:t>migrating </a:t>
-            </a:r>
-            <a:r>
-              <a:rPr lang="en-US" dirty="0" smtClean="0"/>
-              <a:t>or replicating an actor and consists mainly of</a:t>
+              <a:t>The state of an actor is used when migrating or replicating an actor and consists mainly of</a:t>
             </a:r>
           </a:p>
           <a:p>
@@ -7842,7 +7729,6 @@
               <a:rPr lang="en-US" dirty="0" smtClean="0"/>
               <a:t> Replication</a:t>
             </a:r>
-            <a:endParaRPr lang="en-US" dirty="0" smtClean="0"/>
           </a:p>
           <a:p>
             <a:pPr>
@@ -7851,11 +7737,7 @@
             </a:pPr>
             <a:r>
               <a:rPr lang="en-US" dirty="0" smtClean="0"/>
-              <a:t> Fan-in/fan-out </a:t>
-            </a:r>
-            <a:r>
-              <a:rPr lang="en-US" dirty="0" smtClean="0"/>
-              <a:t>model – allowing multiple connections for an </a:t>
+              <a:t> Fan-in/fan-out model – allowing multiple connections for an </a:t>
             </a:r>
             <a:r>
               <a:rPr lang="en-US" dirty="0" err="1" smtClean="0"/>
@@ -7870,11 +7752,7 @@
             </a:pPr>
             <a:r>
               <a:rPr lang="en-US" dirty="0" smtClean="0"/>
-              <a:t> Heartbeat </a:t>
-            </a:r>
-            <a:r>
-              <a:rPr lang="en-US" dirty="0" smtClean="0"/>
-              <a:t>system setup by each runtime creating a Heartbeat actor</a:t>
+              <a:t> Heartbeat system setup by each runtime creating a Heartbeat actor</a:t>
             </a:r>
           </a:p>
           <a:p>
@@ -7904,11 +7782,7 @@
             </a:pPr>
             <a:r>
               <a:rPr lang="en-US" dirty="0" smtClean="0"/>
-              <a:t> Resource </a:t>
-            </a:r>
-            <a:r>
-              <a:rPr lang="en-US" dirty="0" smtClean="0"/>
-              <a:t>reporter – reports CPU usage to the other runtimes</a:t>
+              <a:t> Resource reporter – reports CPU usage to the other runtimes</a:t>
             </a:r>
           </a:p>
           <a:p>
@@ -7918,11 +7792,7 @@
             </a:pPr>
             <a:r>
               <a:rPr lang="en-US" dirty="0" smtClean="0"/>
-              <a:t> Lost </a:t>
-            </a:r>
-            <a:r>
-              <a:rPr lang="en-US" dirty="0" smtClean="0"/>
-              <a:t>node handler – handles lost node</a:t>
+              <a:t> Lost node handler – handles lost node</a:t>
             </a:r>
           </a:p>
           <a:p>
@@ -7932,11 +7802,7 @@
             </a:pPr>
             <a:r>
               <a:rPr lang="en-US" dirty="0" smtClean="0"/>
-              <a:t> Replicator </a:t>
-            </a:r>
-            <a:r>
-              <a:rPr lang="en-US" dirty="0" smtClean="0"/>
-              <a:t>– replicates actors</a:t>
+              <a:t> Replicator – replicates actors</a:t>
             </a:r>
             <a:endParaRPr lang="en-US" dirty="0"/>
           </a:p>
@@ -8029,11 +7895,7 @@
             </a:pPr>
             <a:r>
               <a:rPr lang="en-US" dirty="0" smtClean="0"/>
-              <a:t> Reliability </a:t>
-            </a:r>
-            <a:r>
-              <a:rPr lang="en-US" dirty="0" smtClean="0"/>
-              <a:t>of applications of services in running in distributed environments</a:t>
+              <a:t> Reliability of applications of services in running in distributed environments</a:t>
             </a:r>
           </a:p>
           <a:p>
@@ -8043,11 +7905,7 @@
             </a:pPr>
             <a:r>
               <a:rPr lang="en-US" dirty="0" smtClean="0"/>
-              <a:t> Problems</a:t>
-            </a:r>
-            <a:r>
-              <a:rPr lang="en-US" dirty="0" smtClean="0"/>
-              <a:t>:</a:t>
+              <a:t> Problems:</a:t>
             </a:r>
           </a:p>
           <a:p>
@@ -8390,11 +8248,7 @@
             </a:pPr>
             <a:r>
               <a:rPr lang="en-US" dirty="0" smtClean="0"/>
-              <a:t> The </a:t>
-            </a:r>
-            <a:r>
-              <a:rPr lang="en-US" dirty="0" smtClean="0"/>
-              <a:t>average time </a:t>
+              <a:t> The average time </a:t>
             </a:r>
             <a:r>
               <a:rPr lang="en-US" i="1" dirty="0" smtClean="0"/>
@@ -8910,11 +8764,7 @@
             </a:pPr>
             <a:r>
               <a:rPr lang="en-US" dirty="0" smtClean="0"/>
-              <a:t> One </a:t>
-            </a:r>
-            <a:r>
-              <a:rPr lang="en-US" dirty="0" smtClean="0"/>
-              <a:t>Calvin runtime per server</a:t>
+              <a:t> One Calvin runtime per server</a:t>
             </a:r>
           </a:p>
           <a:p>
@@ -8924,11 +8774,7 @@
             </a:pPr>
             <a:r>
               <a:rPr lang="en-US" dirty="0" smtClean="0"/>
-              <a:t> MTBF </a:t>
-            </a:r>
-            <a:r>
-              <a:rPr lang="en-US" dirty="0" smtClean="0"/>
-              <a:t>for each runtime was 20 seconds</a:t>
+              <a:t> MTBF for each runtime was 20 seconds</a:t>
             </a:r>
           </a:p>
           <a:p>
@@ -8938,11 +8784,7 @@
             </a:pPr>
             <a:r>
               <a:rPr lang="en-US" dirty="0" smtClean="0"/>
-              <a:t> Required </a:t>
-            </a:r>
-            <a:r>
-              <a:rPr lang="en-US" dirty="0" smtClean="0"/>
-              <a:t>reliability: 0.98</a:t>
+              <a:t> Required reliability: 0.98</a:t>
             </a:r>
           </a:p>
           <a:p>
@@ -8975,11 +8817,7 @@
             </a:pPr>
             <a:r>
               <a:rPr lang="en-US" dirty="0" smtClean="0"/>
-              <a:t> Reliability </a:t>
-            </a:r>
-            <a:r>
-              <a:rPr lang="en-US" dirty="0" smtClean="0"/>
-              <a:t>of nodes: R(t) = e</a:t>
+              <a:t> Reliability of nodes: R(t) = e</a:t>
             </a:r>
             <a:r>
               <a:rPr lang="en-US" baseline="30000" dirty="0" smtClean="0"/>
@@ -9407,11 +9245,7 @@
             </a:pPr>
             <a:r>
               <a:rPr lang="en-US" dirty="0" smtClean="0"/>
-              <a:t> Two </a:t>
-            </a:r>
-            <a:r>
-              <a:rPr lang="en-US" dirty="0" smtClean="0"/>
-              <a:t>Calvin runtimes per server</a:t>
+              <a:t> Two Calvin runtimes per server</a:t>
             </a:r>
           </a:p>
           <a:p>
@@ -9421,11 +9255,7 @@
             </a:pPr>
             <a:r>
               <a:rPr lang="en-US" dirty="0" smtClean="0"/>
-              <a:t> MTBFs </a:t>
-            </a:r>
-            <a:r>
-              <a:rPr lang="en-US" dirty="0" smtClean="0"/>
-              <a:t>varied</a:t>
+              <a:t> MTBFs varied</a:t>
             </a:r>
           </a:p>
           <a:p>
@@ -11388,11 +11218,7 @@
             </a:pPr>
             <a:r>
               <a:rPr lang="en-US" dirty="0" smtClean="0"/>
-              <a:t> Reliability </a:t>
-            </a:r>
-            <a:r>
-              <a:rPr lang="en-US" dirty="0" smtClean="0"/>
-              <a:t>of</a:t>
+              <a:t> Reliability of</a:t>
             </a:r>
           </a:p>
           <a:p>
@@ -11429,11 +11255,7 @@
             </a:pPr>
             <a:r>
               <a:rPr lang="en-US" dirty="0" smtClean="0"/>
-              <a:t> Our </a:t>
-            </a:r>
-            <a:r>
-              <a:rPr lang="en-US" dirty="0" smtClean="0"/>
-              <a:t>definition</a:t>
+              <a:t> Our definition</a:t>
             </a:r>
           </a:p>
           <a:p>
@@ -11813,11 +11635,7 @@
             </a:pPr>
             <a:r>
               <a:rPr lang="en-US" dirty="0" smtClean="0"/>
-              <a:t> One </a:t>
-            </a:r>
-            <a:r>
-              <a:rPr lang="en-US" dirty="0" smtClean="0"/>
-              <a:t>Calvin runtime per server</a:t>
+              <a:t> One Calvin runtime per server</a:t>
             </a:r>
           </a:p>
           <a:p>
@@ -11827,11 +11645,7 @@
             </a:pPr>
             <a:r>
               <a:rPr lang="en-US" dirty="0" smtClean="0"/>
-              <a:t> Three </a:t>
-            </a:r>
-            <a:r>
-              <a:rPr lang="en-US" dirty="0" smtClean="0"/>
-              <a:t>stable, </a:t>
+              <a:t> Three stable, </a:t>
             </a:r>
             <a:r>
               <a:rPr lang="en-US" i="1" dirty="0" smtClean="0"/>
@@ -11963,11 +11777,7 @@
             </a:pPr>
             <a:r>
               <a:rPr lang="en-US" dirty="0" smtClean="0"/>
-              <a:t> Reliability </a:t>
-            </a:r>
-            <a:r>
-              <a:rPr lang="en-US" dirty="0" smtClean="0"/>
-              <a:t>of nodes:</a:t>
+              <a:t> Reliability of nodes:</a:t>
             </a:r>
             <a:endParaRPr lang="en-US" dirty="0"/>
           </a:p>
@@ -12237,11 +12047,7 @@
             </a:pPr>
             <a:r>
               <a:rPr lang="en-US" dirty="0" smtClean="0"/>
-              <a:t> Reliability</a:t>
-            </a:r>
-            <a:r>
-              <a:rPr lang="en-US" dirty="0" smtClean="0"/>
-              <a:t>:</a:t>
+              <a:t> Reliability:</a:t>
             </a:r>
             <a:endParaRPr lang="en-US" dirty="0"/>
           </a:p>
@@ -13394,11 +13200,7 @@
             </a:pPr>
             <a:r>
               <a:rPr lang="en-US" dirty="0" smtClean="0"/>
-              <a:t> Two </a:t>
-            </a:r>
-            <a:r>
-              <a:rPr lang="en-US" dirty="0" smtClean="0"/>
-              <a:t>Calvin runtimes per server</a:t>
+              <a:t> Two Calvin runtimes per server</a:t>
             </a:r>
           </a:p>
           <a:p>
@@ -13449,11 +13251,7 @@
             </a:pPr>
             <a:r>
               <a:rPr lang="en-US" dirty="0" smtClean="0"/>
-              <a:t> Killing </a:t>
-            </a:r>
-            <a:r>
-              <a:rPr lang="en-US" dirty="0" smtClean="0"/>
-              <a:t>nodes:</a:t>
+              <a:t> Killing nodes:</a:t>
             </a:r>
             <a:endParaRPr lang="en-US" dirty="0"/>
           </a:p>
@@ -13570,11 +13368,7 @@
             </a:pPr>
             <a:r>
               <a:rPr lang="en-US" dirty="0" smtClean="0"/>
-              <a:t>  MTBF </a:t>
-            </a:r>
-            <a:r>
-              <a:rPr lang="en-US" dirty="0" smtClean="0"/>
-              <a:t>is based on latest 3 values</a:t>
+              <a:t>  MTBF is based on latest 3 values</a:t>
             </a:r>
             <a:endParaRPr lang="en-US" dirty="0"/>
           </a:p>
@@ -13875,11 +13669,7 @@
             </a:pPr>
             <a:r>
               <a:rPr lang="en-US" dirty="0" smtClean="0"/>
-              <a:t> Two </a:t>
-            </a:r>
-            <a:r>
-              <a:rPr lang="en-US" dirty="0" smtClean="0"/>
-              <a:t>runtimes, and one actor with one outgoing port. </a:t>
+              <a:t> Two runtimes, and one actor with one outgoing port. </a:t>
             </a:r>
           </a:p>
           <a:p>
@@ -13889,25 +13679,8 @@
             </a:pPr>
             <a:r>
               <a:rPr lang="en-US" dirty="0" smtClean="0"/>
-              <a:t> The </a:t>
-            </a:r>
-            <a:r>
-              <a:rPr lang="en-US" dirty="0" smtClean="0"/>
-              <a:t>size of the actor state was measured, as well as the time to replicate the actor from one </a:t>
-            </a:r>
-            <a:r>
-              <a:rPr lang="en-US" dirty="0" smtClean="0"/>
-              <a:t>runtime </a:t>
-            </a:r>
-            <a:r>
-              <a:rPr lang="en-US" dirty="0" smtClean="0"/>
-              <a:t>to </a:t>
-            </a:r>
-            <a:r>
-              <a:rPr lang="en-US" dirty="0" smtClean="0"/>
-              <a:t>another. </a:t>
-            </a:r>
-            <a:endParaRPr lang="en-US" dirty="0" smtClean="0"/>
+              <a:t> The size of the actor state was measured, as well as the time to replicate the actor from one runtime to another. </a:t>
+            </a:r>
           </a:p>
           <a:p>
             <a:pPr>
@@ -13916,15 +13689,7 @@
             </a:pPr>
             <a:r>
               <a:rPr lang="en-US" dirty="0" smtClean="0"/>
-              <a:t> The </a:t>
-            </a:r>
-            <a:r>
-              <a:rPr lang="en-US" dirty="0" smtClean="0"/>
-              <a:t>state was increased by increasing the size of the actors port queue</a:t>
-            </a:r>
-            <a:r>
-              <a:rPr lang="en-US" dirty="0" smtClean="0"/>
-              <a:t>.</a:t>
+              <a:t> The state was increased by increasing the size of the actors port queue.</a:t>
             </a:r>
           </a:p>
           <a:p>
@@ -13944,11 +13709,7 @@
             </a:pPr>
             <a:r>
               <a:rPr lang="en-US" dirty="0" smtClean="0"/>
-              <a:t>Intel i</a:t>
-            </a:r>
-            <a:r>
-              <a:rPr lang="en-US" dirty="0" smtClean="0"/>
-              <a:t>5, 2.3 GHz</a:t>
+              <a:t>Intel i5, 2.3 GHz</a:t>
             </a:r>
           </a:p>
           <a:p>
@@ -14175,6 +13936,184 @@
       </p:par>
     </p:tnLst>
   </p:timing>
+</p:sld>
+</file>
+
+<file path=ppt/slides/slide54.xml><?xml version="1.0" encoding="utf-8"?>
+<p:sld xmlns:a="http://schemas.openxmlformats.org/drawingml/2006/main" xmlns:r="http://schemas.openxmlformats.org/officeDocument/2006/relationships" xmlns:p="http://schemas.openxmlformats.org/presentationml/2006/main">
+  <p:cSld>
+    <p:spTree>
+      <p:nvGrpSpPr>
+        <p:cNvPr id="1" name=""/>
+        <p:cNvGrpSpPr/>
+        <p:nvPr/>
+      </p:nvGrpSpPr>
+      <p:grpSpPr>
+        <a:xfrm>
+          <a:off x="0" y="0"/>
+          <a:ext cx="0" cy="0"/>
+          <a:chOff x="0" y="0"/>
+          <a:chExt cx="0" cy="0"/>
+        </a:xfrm>
+      </p:grpSpPr>
+      <p:sp>
+        <p:nvSpPr>
+          <p:cNvPr id="2" name="Rubrik 1"/>
+          <p:cNvSpPr>
+            <a:spLocks noGrp="1"/>
+          </p:cNvSpPr>
+          <p:nvPr>
+            <p:ph type="title"/>
+          </p:nvPr>
+        </p:nvSpPr>
+        <p:spPr/>
+        <p:txBody>
+          <a:bodyPr/>
+          <a:lstStyle/>
+          <a:p>
+            <a:r>
+              <a:rPr lang="en-US" dirty="0" smtClean="0"/>
+              <a:t>Future</a:t>
+            </a:r>
+            <a:r>
+              <a:rPr lang="sv-SE" dirty="0" smtClean="0"/>
+              <a:t> </a:t>
+            </a:r>
+            <a:r>
+              <a:rPr lang="en-US" dirty="0" smtClean="0"/>
+              <a:t>work</a:t>
+            </a:r>
+            <a:endParaRPr lang="en-US" dirty="0"/>
+          </a:p>
+        </p:txBody>
+      </p:sp>
+      <p:sp>
+        <p:nvSpPr>
+          <p:cNvPr id="3" name="Platshållare för innehåll 2"/>
+          <p:cNvSpPr>
+            <a:spLocks noGrp="1"/>
+          </p:cNvSpPr>
+          <p:nvPr>
+            <p:ph idx="1"/>
+          </p:nvPr>
+        </p:nvSpPr>
+        <p:spPr/>
+        <p:txBody>
+          <a:bodyPr/>
+          <a:lstStyle/>
+          <a:p>
+            <a:pPr>
+              <a:buFont typeface="Arial" panose="020B0604020202020204" pitchFamily="34" charset="0"/>
+              <a:buChar char="•"/>
+            </a:pPr>
+            <a:r>
+              <a:rPr lang="sv-SE" dirty="0" smtClean="0"/>
+              <a:t> The </a:t>
+            </a:r>
+            <a:r>
+              <a:rPr lang="en-US" dirty="0" smtClean="0"/>
+              <a:t>reliability</a:t>
+            </a:r>
+            <a:r>
+              <a:rPr lang="sv-SE" dirty="0" smtClean="0"/>
+              <a:t> </a:t>
+            </a:r>
+            <a:r>
+              <a:rPr lang="en-US" dirty="0" smtClean="0"/>
+              <a:t>model</a:t>
+            </a:r>
+            <a:r>
+              <a:rPr lang="sv-SE" dirty="0" smtClean="0"/>
+              <a:t> is </a:t>
+            </a:r>
+            <a:r>
+              <a:rPr lang="en-US" dirty="0" smtClean="0"/>
+              <a:t>exchangeable. It can be extended through:</a:t>
+            </a:r>
+          </a:p>
+          <a:p>
+            <a:pPr lvl="1">
+              <a:buFont typeface="Arial" panose="020B0604020202020204" pitchFamily="34" charset="0"/>
+              <a:buChar char="•"/>
+            </a:pPr>
+            <a:r>
+              <a:rPr lang="en-US" dirty="0" smtClean="0"/>
+              <a:t>Adding more parameter, e.g. considering link failures</a:t>
+            </a:r>
+          </a:p>
+          <a:p>
+            <a:pPr lvl="1">
+              <a:buFont typeface="Arial" panose="020B0604020202020204" pitchFamily="34" charset="0"/>
+              <a:buChar char="•"/>
+            </a:pPr>
+            <a:r>
+              <a:rPr lang="en-US" dirty="0" smtClean="0"/>
+              <a:t>Applying machine learning</a:t>
+            </a:r>
+          </a:p>
+          <a:p>
+            <a:pPr>
+              <a:buFont typeface="Arial" panose="020B0604020202020204" pitchFamily="34" charset="0"/>
+              <a:buChar char="•"/>
+            </a:pPr>
+            <a:r>
+              <a:rPr lang="en-US" dirty="0" smtClean="0"/>
+              <a:t> The scheduling can be extended by</a:t>
+            </a:r>
+          </a:p>
+          <a:p>
+            <a:pPr lvl="1">
+              <a:buFont typeface="Arial" panose="020B0604020202020204" pitchFamily="34" charset="0"/>
+              <a:buChar char="•"/>
+            </a:pPr>
+            <a:r>
+              <a:rPr lang="en-US" dirty="0" smtClean="0"/>
+              <a:t>Not placing replicas in the same physical location, e.g. in the same rack.</a:t>
+            </a:r>
+          </a:p>
+          <a:p>
+            <a:pPr lvl="1">
+              <a:buFont typeface="Arial" panose="020B0604020202020204" pitchFamily="34" charset="0"/>
+              <a:buChar char="•"/>
+            </a:pPr>
+            <a:r>
+              <a:rPr lang="en-US" dirty="0" smtClean="0"/>
+              <a:t>Include nodes´ load and resources in the scheduling</a:t>
+            </a:r>
+          </a:p>
+          <a:p>
+            <a:pPr>
+              <a:buFont typeface="Arial" panose="020B0604020202020204" pitchFamily="34" charset="0"/>
+              <a:buChar char="•"/>
+            </a:pPr>
+            <a:r>
+              <a:rPr lang="sv-SE" dirty="0"/>
+              <a:t> </a:t>
+            </a:r>
+            <a:r>
+              <a:rPr lang="en-US" dirty="0" smtClean="0"/>
+              <a:t>Adding a consensus algorithm</a:t>
+            </a:r>
+          </a:p>
+          <a:p>
+            <a:pPr lvl="1">
+              <a:buFont typeface="Arial" panose="020B0604020202020204" pitchFamily="34" charset="0"/>
+              <a:buChar char="•"/>
+            </a:pPr>
+            <a:endParaRPr lang="en-US" dirty="0" smtClean="0"/>
+          </a:p>
+        </p:txBody>
+      </p:sp>
+    </p:spTree>
+    <p:extLst>
+      <p:ext uri="{BB962C8B-B14F-4D97-AF65-F5344CB8AC3E}">
+        <p14:creationId xmlns:p14="http://schemas.microsoft.com/office/powerpoint/2010/main" val="2715388920"/>
+      </p:ext>
+    </p:extLst>
+  </p:cSld>
+  <p:clrMapOvr>
+    <a:masterClrMapping/>
+  </p:clrMapOvr>
 </p:sld>
 </file>
 
@@ -14411,7 +14350,6 @@
               <a:rPr lang="en-US" dirty="0" smtClean="0"/>
               <a:t>assumptions:</a:t>
             </a:r>
-            <a:endParaRPr lang="en-US" dirty="0" smtClean="0"/>
           </a:p>
           <a:p>
             <a:pPr lvl="1">
@@ -14527,8 +14465,8 @@
           </a:p>
         </p:txBody>
       </p:sp>
-      <mc:AlternateContent xmlns:mc="http://schemas.openxmlformats.org/markup-compatibility/2006">
-        <mc:Choice xmlns:a14="http://schemas.microsoft.com/office/drawing/2010/main" Requires="a14">
+      <mc:AlternateContent xmlns:mc="http://schemas.openxmlformats.org/markup-compatibility/2006" xmlns:a14="http://schemas.microsoft.com/office/drawing/2010/main">
+        <mc:Choice Requires="a14">
           <p:sp>
             <p:nvSpPr>
               <p:cNvPr id="3" name="Content Placeholder 2"/>
@@ -14652,7 +14590,7 @@
             </p:txBody>
           </p:sp>
         </mc:Choice>
-        <mc:Fallback>
+        <mc:Fallback xmlns="">
           <p:sp>
             <p:nvSpPr>
               <p:cNvPr id="3" name="Content Placeholder 2"/>

</xml_diff>

<commit_message>
add more Swedish notes
</commit_message>
<xml_diff>
--- a/presentation/presentation.pptx
+++ b/presentation/presentation.pptx
@@ -2254,10 +2254,270 @@
             </a:r>
           </a:p>
           <a:p>
-            <a:endParaRPr lang="en-US" baseline="0" smtClean="0"/>
-          </a:p>
-          <a:p>
-            <a:endParaRPr lang="en-US"/>
+            <a:endParaRPr lang="en-US" baseline="0" dirty="0" smtClean="0"/>
+          </a:p>
+          <a:p>
+            <a:r>
+              <a:rPr lang="en-US" baseline="0" dirty="0" err="1" smtClean="0"/>
+              <a:t>För</a:t>
+            </a:r>
+            <a:r>
+              <a:rPr lang="en-US" baseline="0" dirty="0" smtClean="0"/>
+              <a:t> </a:t>
+            </a:r>
+            <a:r>
+              <a:rPr lang="en-US" baseline="0" dirty="0" err="1" smtClean="0"/>
+              <a:t>själva</a:t>
+            </a:r>
+            <a:r>
+              <a:rPr lang="en-US" baseline="0" dirty="0" smtClean="0"/>
+              <a:t> </a:t>
+            </a:r>
+            <a:r>
+              <a:rPr lang="en-US" baseline="0" dirty="0" err="1" smtClean="0"/>
+              <a:t>miljön</a:t>
+            </a:r>
+            <a:r>
+              <a:rPr lang="en-US" baseline="0" dirty="0" smtClean="0"/>
+              <a:t> med </a:t>
+            </a:r>
+            <a:r>
+              <a:rPr lang="en-US" baseline="0" dirty="0" err="1" smtClean="0"/>
+              <a:t>servrar</a:t>
+            </a:r>
+            <a:r>
+              <a:rPr lang="en-US" baseline="0" dirty="0" smtClean="0"/>
+              <a:t>, </a:t>
+            </a:r>
+            <a:r>
+              <a:rPr lang="en-US" baseline="0" dirty="0" err="1" smtClean="0"/>
+              <a:t>så</a:t>
+            </a:r>
+            <a:r>
+              <a:rPr lang="en-US" baseline="0" dirty="0" smtClean="0"/>
+              <a:t> </a:t>
+            </a:r>
+            <a:r>
+              <a:rPr lang="en-US" baseline="0" dirty="0" err="1" smtClean="0"/>
+              <a:t>har</a:t>
+            </a:r>
+            <a:r>
+              <a:rPr lang="en-US" baseline="0" dirty="0" smtClean="0"/>
+              <a:t> vi </a:t>
+            </a:r>
+            <a:r>
+              <a:rPr lang="en-US" baseline="0" dirty="0" err="1" smtClean="0"/>
+              <a:t>utgått</a:t>
+            </a:r>
+            <a:r>
+              <a:rPr lang="en-US" baseline="0" dirty="0" smtClean="0"/>
+              <a:t> </a:t>
+            </a:r>
+            <a:r>
+              <a:rPr lang="en-US" baseline="0" dirty="0" err="1" smtClean="0"/>
+              <a:t>från</a:t>
+            </a:r>
+            <a:r>
+              <a:rPr lang="en-US" baseline="0" dirty="0" smtClean="0"/>
+              <a:t> </a:t>
+            </a:r>
+            <a:r>
+              <a:rPr lang="en-US" baseline="0" dirty="0" err="1" smtClean="0"/>
+              <a:t>att</a:t>
+            </a:r>
+            <a:r>
+              <a:rPr lang="en-US" baseline="0" dirty="0" smtClean="0"/>
+              <a:t> </a:t>
+            </a:r>
+            <a:r>
+              <a:rPr lang="en-US" baseline="0" dirty="0" err="1" smtClean="0"/>
+              <a:t>alla</a:t>
+            </a:r>
+            <a:r>
+              <a:rPr lang="en-US" baseline="0" dirty="0" smtClean="0"/>
+              <a:t> </a:t>
+            </a:r>
+            <a:r>
+              <a:rPr lang="en-US" baseline="0" dirty="0" err="1" smtClean="0"/>
+              <a:t>tillgängliga</a:t>
+            </a:r>
+            <a:r>
+              <a:rPr lang="en-US" baseline="0" dirty="0" smtClean="0"/>
+              <a:t> </a:t>
+            </a:r>
+            <a:r>
+              <a:rPr lang="en-US" baseline="0" dirty="0" err="1" smtClean="0"/>
+              <a:t>servrar</a:t>
+            </a:r>
+            <a:r>
+              <a:rPr lang="en-US" baseline="0" dirty="0" smtClean="0"/>
+              <a:t> </a:t>
+            </a:r>
+            <a:r>
+              <a:rPr lang="en-US" baseline="0" dirty="0" err="1" smtClean="0"/>
+              <a:t>finns</a:t>
+            </a:r>
+            <a:r>
+              <a:rPr lang="en-US" baseline="0" dirty="0" smtClean="0"/>
+              <a:t> I </a:t>
+            </a:r>
+            <a:r>
+              <a:rPr lang="en-US" baseline="0" dirty="0" err="1" smtClean="0"/>
+              <a:t>samma</a:t>
+            </a:r>
+            <a:r>
+              <a:rPr lang="en-US" baseline="0" dirty="0" smtClean="0"/>
+              <a:t> cluster med </a:t>
+            </a:r>
+            <a:r>
+              <a:rPr lang="en-US" baseline="0" dirty="0" err="1" smtClean="0"/>
+              <a:t>reduntanta</a:t>
+            </a:r>
+            <a:r>
+              <a:rPr lang="en-US" baseline="0" dirty="0" smtClean="0"/>
+              <a:t> </a:t>
+            </a:r>
+            <a:r>
+              <a:rPr lang="en-US" baseline="0" dirty="0" err="1" smtClean="0"/>
+              <a:t>länkar</a:t>
+            </a:r>
+            <a:r>
+              <a:rPr lang="en-US" baseline="0" dirty="0" smtClean="0"/>
+              <a:t> </a:t>
+            </a:r>
+            <a:r>
+              <a:rPr lang="en-US" baseline="0" dirty="0" err="1" smtClean="0"/>
+              <a:t>och</a:t>
+            </a:r>
+            <a:r>
+              <a:rPr lang="en-US" baseline="0" dirty="0" smtClean="0"/>
+              <a:t> </a:t>
+            </a:r>
+            <a:r>
+              <a:rPr lang="en-US" baseline="0" dirty="0" err="1" smtClean="0"/>
+              <a:t>att</a:t>
+            </a:r>
+            <a:r>
+              <a:rPr lang="en-US" baseline="0" dirty="0" smtClean="0"/>
+              <a:t> </a:t>
+            </a:r>
+            <a:r>
+              <a:rPr lang="en-US" baseline="0" dirty="0" err="1" smtClean="0"/>
+              <a:t>alla</a:t>
+            </a:r>
+            <a:r>
+              <a:rPr lang="en-US" baseline="0" dirty="0" smtClean="0"/>
+              <a:t> </a:t>
+            </a:r>
+            <a:r>
+              <a:rPr lang="en-US" baseline="0" dirty="0" err="1" smtClean="0"/>
+              <a:t>noder</a:t>
+            </a:r>
+            <a:r>
+              <a:rPr lang="en-US" baseline="0" dirty="0" smtClean="0"/>
+              <a:t> </a:t>
+            </a:r>
+            <a:r>
+              <a:rPr lang="en-US" baseline="0" dirty="0" err="1" smtClean="0"/>
+              <a:t>kan</a:t>
+            </a:r>
+            <a:r>
+              <a:rPr lang="en-US" baseline="0" dirty="0" smtClean="0"/>
+              <a:t> </a:t>
+            </a:r>
+            <a:r>
+              <a:rPr lang="en-US" baseline="0" dirty="0" err="1" smtClean="0"/>
+              <a:t>kommunicera</a:t>
+            </a:r>
+            <a:r>
+              <a:rPr lang="en-US" baseline="0" dirty="0" smtClean="0"/>
+              <a:t> med </a:t>
+            </a:r>
+            <a:r>
+              <a:rPr lang="en-US" baseline="0" dirty="0" err="1" smtClean="0"/>
+              <a:t>varandra</a:t>
+            </a:r>
+            <a:r>
+              <a:rPr lang="en-US" baseline="0" dirty="0" smtClean="0"/>
+              <a:t>.</a:t>
+            </a:r>
+          </a:p>
+          <a:p>
+            <a:endParaRPr lang="en-US" baseline="0" dirty="0" smtClean="0"/>
+          </a:p>
+          <a:p>
+            <a:r>
+              <a:rPr lang="en-US" baseline="0" dirty="0" err="1" smtClean="0"/>
+              <a:t>Tex</a:t>
+            </a:r>
+            <a:r>
+              <a:rPr lang="en-US" baseline="0" dirty="0" smtClean="0"/>
+              <a:t> </a:t>
+            </a:r>
+            <a:r>
+              <a:rPr lang="en-US" baseline="0" dirty="0" err="1" smtClean="0"/>
+              <a:t>så</a:t>
+            </a:r>
+            <a:r>
+              <a:rPr lang="en-US" baseline="0" dirty="0" smtClean="0"/>
+              <a:t> </a:t>
+            </a:r>
+            <a:r>
+              <a:rPr lang="en-US" baseline="0" dirty="0" err="1" smtClean="0"/>
+              <a:t>kan</a:t>
+            </a:r>
+            <a:r>
+              <a:rPr lang="en-US" baseline="0" dirty="0" smtClean="0"/>
+              <a:t> nod A </a:t>
+            </a:r>
+            <a:r>
+              <a:rPr lang="en-US" baseline="0" dirty="0" err="1" smtClean="0"/>
+              <a:t>och</a:t>
+            </a:r>
+            <a:r>
+              <a:rPr lang="en-US" baseline="0" dirty="0" smtClean="0"/>
+              <a:t> nod B </a:t>
+            </a:r>
+            <a:r>
+              <a:rPr lang="en-US" baseline="0" dirty="0" err="1" smtClean="0"/>
+              <a:t>kommunicera</a:t>
+            </a:r>
+            <a:r>
+              <a:rPr lang="en-US" baseline="0" dirty="0" smtClean="0"/>
+              <a:t> med </a:t>
+            </a:r>
+            <a:r>
+              <a:rPr lang="en-US" baseline="0" dirty="0" err="1" smtClean="0"/>
+              <a:t>varandra</a:t>
+            </a:r>
+            <a:r>
+              <a:rPr lang="en-US" baseline="0" dirty="0" smtClean="0"/>
+              <a:t> </a:t>
+            </a:r>
+            <a:r>
+              <a:rPr lang="en-US" baseline="0" dirty="0" err="1" smtClean="0"/>
+              <a:t>även</a:t>
+            </a:r>
+            <a:r>
+              <a:rPr lang="en-US" baseline="0" dirty="0" smtClean="0"/>
+              <a:t> om nod C </a:t>
+            </a:r>
+            <a:r>
+              <a:rPr lang="en-US" baseline="0" dirty="0" err="1" smtClean="0"/>
+              <a:t>skulle</a:t>
+            </a:r>
+            <a:r>
+              <a:rPr lang="en-US" baseline="0" dirty="0" smtClean="0"/>
+              <a:t> </a:t>
+            </a:r>
+            <a:r>
+              <a:rPr lang="en-US" baseline="0" dirty="0" err="1" smtClean="0"/>
+              <a:t>dö</a:t>
+            </a:r>
+            <a:r>
+              <a:rPr lang="en-US" baseline="0" dirty="0" smtClean="0"/>
+              <a:t>.</a:t>
+            </a:r>
           </a:p>
         </p:txBody>
       </p:sp>
@@ -2288,6 +2548,715 @@
     <p:extLst>
       <p:ext uri="{BB962C8B-B14F-4D97-AF65-F5344CB8AC3E}">
         <p14:creationId xmlns:p14="http://schemas.microsoft.com/office/powerpoint/2010/main" val="1358390816"/>
+      </p:ext>
+    </p:extLst>
+  </p:cSld>
+  <p:clrMapOvr>
+    <a:masterClrMapping/>
+  </p:clrMapOvr>
+</p:notes>
+</file>
+
+<file path=ppt/notesSlides/notesSlide5.xml><?xml version="1.0" encoding="utf-8"?>
+<p:notes xmlns:a="http://schemas.openxmlformats.org/drawingml/2006/main" xmlns:r="http://schemas.openxmlformats.org/officeDocument/2006/relationships" xmlns:p="http://schemas.openxmlformats.org/presentationml/2006/main">
+  <p:cSld>
+    <p:spTree>
+      <p:nvGrpSpPr>
+        <p:cNvPr id="1" name=""/>
+        <p:cNvGrpSpPr/>
+        <p:nvPr/>
+      </p:nvGrpSpPr>
+      <p:grpSpPr>
+        <a:xfrm>
+          <a:off x="0" y="0"/>
+          <a:ext cx="0" cy="0"/>
+          <a:chOff x="0" y="0"/>
+          <a:chExt cx="0" cy="0"/>
+        </a:xfrm>
+      </p:grpSpPr>
+      <p:sp>
+        <p:nvSpPr>
+          <p:cNvPr id="2" name="Slide Image Placeholder 1"/>
+          <p:cNvSpPr>
+            <a:spLocks noGrp="1" noRot="1" noChangeAspect="1"/>
+          </p:cNvSpPr>
+          <p:nvPr>
+            <p:ph type="sldImg"/>
+          </p:nvPr>
+        </p:nvSpPr>
+        <p:spPr/>
+      </p:sp>
+      <p:sp>
+        <p:nvSpPr>
+          <p:cNvPr id="3" name="Notes Placeholder 2"/>
+          <p:cNvSpPr>
+            <a:spLocks noGrp="1"/>
+          </p:cNvSpPr>
+          <p:nvPr>
+            <p:ph type="body" idx="1"/>
+          </p:nvPr>
+        </p:nvSpPr>
+        <p:spPr/>
+        <p:txBody>
+          <a:bodyPr/>
+          <a:lstStyle/>
+          <a:p>
+            <a:r>
+              <a:rPr lang="en-US" dirty="0" err="1" smtClean="0"/>
+              <a:t>Applikationen</a:t>
+            </a:r>
+            <a:r>
+              <a:rPr lang="en-US" baseline="0" dirty="0" smtClean="0"/>
+              <a:t> vi </a:t>
+            </a:r>
+            <a:r>
+              <a:rPr lang="en-US" baseline="0" dirty="0" err="1" smtClean="0"/>
+              <a:t>tänker</a:t>
+            </a:r>
+            <a:r>
+              <a:rPr lang="en-US" baseline="0" dirty="0" smtClean="0"/>
+              <a:t> </a:t>
+            </a:r>
+            <a:r>
+              <a:rPr lang="en-US" baseline="0" dirty="0" err="1" smtClean="0"/>
+              <a:t>oss</a:t>
+            </a:r>
+            <a:r>
+              <a:rPr lang="en-US" baseline="0" dirty="0" smtClean="0"/>
+              <a:t> </a:t>
+            </a:r>
+            <a:r>
+              <a:rPr lang="en-US" baseline="0" dirty="0" err="1" smtClean="0"/>
+              <a:t>är</a:t>
+            </a:r>
+            <a:r>
+              <a:rPr lang="en-US" baseline="0" dirty="0" smtClean="0"/>
+              <a:t> </a:t>
+            </a:r>
+            <a:r>
+              <a:rPr lang="en-US" baseline="0" dirty="0" err="1" smtClean="0"/>
+              <a:t>i</a:t>
+            </a:r>
+            <a:r>
+              <a:rPr lang="en-US" baseline="0" dirty="0" smtClean="0"/>
+              <a:t> </a:t>
+            </a:r>
+            <a:r>
+              <a:rPr lang="en-US" baseline="0" dirty="0" err="1" smtClean="0"/>
+              <a:t>dess</a:t>
+            </a:r>
+            <a:r>
+              <a:rPr lang="en-US" baseline="0" dirty="0" smtClean="0"/>
+              <a:t> </a:t>
+            </a:r>
+            <a:r>
+              <a:rPr lang="en-US" baseline="0" dirty="0" err="1" smtClean="0"/>
+              <a:t>enklaste</a:t>
+            </a:r>
+            <a:r>
+              <a:rPr lang="en-US" baseline="0" dirty="0" smtClean="0"/>
+              <a:t> fall </a:t>
+            </a:r>
+            <a:r>
+              <a:rPr lang="en-US" baseline="0" dirty="0" err="1" smtClean="0"/>
+              <a:t>bestånde</a:t>
+            </a:r>
+            <a:r>
+              <a:rPr lang="en-US" baseline="0" dirty="0" smtClean="0"/>
+              <a:t> </a:t>
+            </a:r>
+            <a:r>
+              <a:rPr lang="en-US" baseline="0" dirty="0" err="1" smtClean="0"/>
+              <a:t>av</a:t>
+            </a:r>
+            <a:r>
+              <a:rPr lang="en-US" baseline="0" dirty="0" smtClean="0"/>
+              <a:t> 3 </a:t>
+            </a:r>
+            <a:r>
+              <a:rPr lang="en-US" baseline="0" dirty="0" err="1" smtClean="0"/>
+              <a:t>delar</a:t>
+            </a:r>
+            <a:r>
+              <a:rPr lang="en-US" baseline="0" dirty="0" smtClean="0"/>
+              <a:t>. En </a:t>
+            </a:r>
+            <a:r>
+              <a:rPr lang="en-US" baseline="0" dirty="0" err="1" smtClean="0"/>
+              <a:t>producent</a:t>
+            </a:r>
+            <a:r>
+              <a:rPr lang="en-US" baseline="0" dirty="0" smtClean="0"/>
+              <a:t>, </a:t>
+            </a:r>
+            <a:r>
+              <a:rPr lang="en-US" baseline="0" dirty="0" err="1" smtClean="0"/>
+              <a:t>som</a:t>
+            </a:r>
+            <a:r>
+              <a:rPr lang="en-US" baseline="0" dirty="0" smtClean="0"/>
+              <a:t> </a:t>
+            </a:r>
+            <a:r>
+              <a:rPr lang="en-US" baseline="0" dirty="0" err="1" smtClean="0"/>
+              <a:t>producerar</a:t>
+            </a:r>
+            <a:r>
+              <a:rPr lang="en-US" baseline="0" dirty="0" smtClean="0"/>
+              <a:t> </a:t>
+            </a:r>
+            <a:r>
+              <a:rPr lang="en-US" baseline="0" dirty="0" err="1" smtClean="0"/>
+              <a:t>någon</a:t>
+            </a:r>
+            <a:r>
+              <a:rPr lang="en-US" baseline="0" dirty="0" smtClean="0"/>
+              <a:t> form </a:t>
+            </a:r>
+            <a:r>
+              <a:rPr lang="en-US" baseline="0" dirty="0" err="1" smtClean="0"/>
+              <a:t>av</a:t>
+            </a:r>
+            <a:r>
+              <a:rPr lang="en-US" baseline="0" dirty="0" smtClean="0"/>
+              <a:t> data </a:t>
+            </a:r>
+            <a:r>
+              <a:rPr lang="en-US" baseline="0" dirty="0" err="1" smtClean="0"/>
+              <a:t>som</a:t>
+            </a:r>
+            <a:r>
+              <a:rPr lang="en-US" baseline="0" dirty="0" smtClean="0"/>
+              <a:t> </a:t>
+            </a:r>
+            <a:r>
+              <a:rPr lang="en-US" baseline="0" dirty="0" err="1" smtClean="0"/>
+              <a:t>måste</a:t>
+            </a:r>
+            <a:r>
+              <a:rPr lang="en-US" baseline="0" dirty="0" smtClean="0"/>
+              <a:t> </a:t>
+            </a:r>
+            <a:r>
+              <a:rPr lang="en-US" baseline="0" dirty="0" err="1" smtClean="0"/>
+              <a:t>behandlas</a:t>
+            </a:r>
+            <a:r>
+              <a:rPr lang="en-US" baseline="0" dirty="0" smtClean="0"/>
+              <a:t>. </a:t>
+            </a:r>
+            <a:r>
+              <a:rPr lang="en-US" baseline="0" dirty="0" err="1" smtClean="0"/>
+              <a:t>Datan</a:t>
+            </a:r>
+            <a:r>
+              <a:rPr lang="en-US" baseline="0" dirty="0" smtClean="0"/>
+              <a:t> </a:t>
+            </a:r>
+            <a:r>
+              <a:rPr lang="en-US" baseline="0" dirty="0" err="1" smtClean="0"/>
+              <a:t>skickas</a:t>
+            </a:r>
+            <a:r>
+              <a:rPr lang="en-US" baseline="0" dirty="0" smtClean="0"/>
+              <a:t> till en </a:t>
+            </a:r>
+            <a:r>
+              <a:rPr lang="en-US" baseline="0" dirty="0" err="1" smtClean="0"/>
+              <a:t>tjänst</a:t>
+            </a:r>
+            <a:r>
+              <a:rPr lang="en-US" baseline="0" dirty="0" smtClean="0"/>
+              <a:t> </a:t>
+            </a:r>
+            <a:r>
+              <a:rPr lang="en-US" baseline="0" dirty="0" err="1" smtClean="0"/>
+              <a:t>som</a:t>
+            </a:r>
+            <a:r>
+              <a:rPr lang="en-US" baseline="0" dirty="0" smtClean="0"/>
+              <a:t> </a:t>
+            </a:r>
+            <a:r>
+              <a:rPr lang="en-US" baseline="0" dirty="0" err="1" smtClean="0"/>
+              <a:t>gör</a:t>
+            </a:r>
+            <a:r>
+              <a:rPr lang="en-US" baseline="0" dirty="0" smtClean="0"/>
+              <a:t> </a:t>
+            </a:r>
+            <a:r>
+              <a:rPr lang="en-US" baseline="0" dirty="0" err="1" smtClean="0"/>
+              <a:t>beräkningar</a:t>
+            </a:r>
+            <a:r>
+              <a:rPr lang="en-US" baseline="0" dirty="0" smtClean="0"/>
+              <a:t> </a:t>
+            </a:r>
+            <a:r>
+              <a:rPr lang="en-US" baseline="0" dirty="0" err="1" smtClean="0"/>
+              <a:t>på</a:t>
+            </a:r>
+            <a:r>
+              <a:rPr lang="en-US" baseline="0" dirty="0" smtClean="0"/>
+              <a:t> </a:t>
+            </a:r>
+            <a:r>
+              <a:rPr lang="en-US" baseline="0" dirty="0" err="1" smtClean="0"/>
+              <a:t>datan</a:t>
+            </a:r>
+            <a:r>
+              <a:rPr lang="en-US" baseline="0" dirty="0" smtClean="0"/>
+              <a:t> </a:t>
+            </a:r>
+            <a:r>
+              <a:rPr lang="en-US" baseline="0" dirty="0" err="1" smtClean="0"/>
+              <a:t>och</a:t>
+            </a:r>
+            <a:r>
+              <a:rPr lang="en-US" baseline="0" dirty="0" smtClean="0"/>
+              <a:t> </a:t>
+            </a:r>
+            <a:r>
+              <a:rPr lang="en-US" baseline="0" dirty="0" err="1" smtClean="0"/>
+              <a:t>skickar</a:t>
+            </a:r>
+            <a:r>
+              <a:rPr lang="en-US" baseline="0" dirty="0" smtClean="0"/>
+              <a:t> </a:t>
+            </a:r>
+            <a:r>
+              <a:rPr lang="en-US" baseline="0" dirty="0" err="1" smtClean="0"/>
+              <a:t>resultatet</a:t>
+            </a:r>
+            <a:r>
+              <a:rPr lang="en-US" baseline="0" dirty="0" smtClean="0"/>
+              <a:t> till en </a:t>
+            </a:r>
+            <a:r>
+              <a:rPr lang="en-US" baseline="0" dirty="0" err="1" smtClean="0"/>
+              <a:t>konsument</a:t>
+            </a:r>
+            <a:r>
+              <a:rPr lang="en-US" baseline="0" dirty="0" smtClean="0"/>
+              <a:t>.</a:t>
+            </a:r>
+          </a:p>
+          <a:p>
+            <a:endParaRPr lang="en-US" baseline="0" dirty="0" smtClean="0"/>
+          </a:p>
+          <a:p>
+            <a:r>
+              <a:rPr lang="en-US" baseline="0" dirty="0" smtClean="0"/>
+              <a:t>Vid </a:t>
+            </a:r>
+            <a:r>
+              <a:rPr lang="en-US" baseline="0" dirty="0" err="1" smtClean="0"/>
+              <a:t>replicering</a:t>
+            </a:r>
+            <a:r>
+              <a:rPr lang="en-US" baseline="0" dirty="0" smtClean="0"/>
+              <a:t> </a:t>
+            </a:r>
+            <a:r>
+              <a:rPr lang="en-US" baseline="0" dirty="0" err="1" smtClean="0"/>
+              <a:t>så</a:t>
+            </a:r>
+            <a:r>
+              <a:rPr lang="en-US" baseline="0" dirty="0" smtClean="0"/>
+              <a:t> </a:t>
+            </a:r>
+            <a:r>
+              <a:rPr lang="en-US" baseline="0" dirty="0" err="1" smtClean="0"/>
+              <a:t>får</a:t>
+            </a:r>
+            <a:r>
+              <a:rPr lang="en-US" baseline="0" dirty="0" smtClean="0"/>
+              <a:t> </a:t>
+            </a:r>
+            <a:r>
+              <a:rPr lang="en-US" baseline="0" dirty="0" err="1" smtClean="0"/>
+              <a:t>varje</a:t>
+            </a:r>
+            <a:r>
+              <a:rPr lang="en-US" baseline="0" dirty="0" smtClean="0"/>
+              <a:t> </a:t>
+            </a:r>
+            <a:r>
+              <a:rPr lang="en-US" baseline="0" dirty="0" err="1" smtClean="0"/>
+              <a:t>replika</a:t>
+            </a:r>
+            <a:r>
+              <a:rPr lang="en-US" baseline="0" dirty="0" smtClean="0"/>
+              <a:t> </a:t>
+            </a:r>
+            <a:r>
+              <a:rPr lang="en-US" baseline="0" dirty="0" err="1" smtClean="0"/>
+              <a:t>samma</a:t>
+            </a:r>
+            <a:r>
+              <a:rPr lang="en-US" baseline="0" dirty="0" smtClean="0"/>
+              <a:t> input. </a:t>
+            </a:r>
+            <a:r>
+              <a:rPr lang="en-US" baseline="0" dirty="0" err="1" smtClean="0"/>
+              <a:t>Replikorna</a:t>
+            </a:r>
+            <a:r>
+              <a:rPr lang="en-US" baseline="0" dirty="0" smtClean="0"/>
+              <a:t> </a:t>
+            </a:r>
+            <a:r>
+              <a:rPr lang="en-US" baseline="0" dirty="0" err="1" smtClean="0"/>
+              <a:t>kan</a:t>
+            </a:r>
+            <a:r>
+              <a:rPr lang="en-US" baseline="0" dirty="0" smtClean="0"/>
+              <a:t> dock </a:t>
+            </a:r>
+            <a:r>
+              <a:rPr lang="en-US" baseline="0" dirty="0" err="1" smtClean="0"/>
+              <a:t>vara</a:t>
+            </a:r>
+            <a:r>
+              <a:rPr lang="en-US" baseline="0" dirty="0" smtClean="0"/>
+              <a:t> lite I </a:t>
+            </a:r>
+            <a:r>
+              <a:rPr lang="en-US" baseline="0" dirty="0" err="1" smtClean="0"/>
+              <a:t>ofas</a:t>
+            </a:r>
+            <a:r>
+              <a:rPr lang="en-US" baseline="0" dirty="0" smtClean="0"/>
+              <a:t>, men timing issues </a:t>
+            </a:r>
+            <a:r>
+              <a:rPr lang="en-US" baseline="0" dirty="0" err="1" smtClean="0"/>
+              <a:t>undvikes</a:t>
+            </a:r>
+            <a:r>
+              <a:rPr lang="en-US" baseline="0" dirty="0" smtClean="0"/>
+              <a:t> </a:t>
+            </a:r>
+            <a:r>
+              <a:rPr lang="en-US" baseline="0" dirty="0" err="1" smtClean="0"/>
+              <a:t>genom</a:t>
+            </a:r>
+            <a:r>
+              <a:rPr lang="en-US" baseline="0" dirty="0" smtClean="0"/>
+              <a:t> </a:t>
+            </a:r>
+            <a:r>
+              <a:rPr lang="en-US" baseline="0" dirty="0" err="1" smtClean="0"/>
+              <a:t>att</a:t>
+            </a:r>
+            <a:r>
+              <a:rPr lang="en-US" baseline="0" dirty="0" smtClean="0"/>
+              <a:t> anta </a:t>
+            </a:r>
+            <a:r>
+              <a:rPr lang="en-US" baseline="0" dirty="0" err="1" smtClean="0"/>
+              <a:t>att</a:t>
+            </a:r>
+            <a:r>
+              <a:rPr lang="en-US" baseline="0" dirty="0" smtClean="0"/>
+              <a:t> </a:t>
+            </a:r>
+            <a:r>
+              <a:rPr lang="en-US" baseline="0" dirty="0" err="1" smtClean="0"/>
+              <a:t>replikorna</a:t>
+            </a:r>
+            <a:r>
+              <a:rPr lang="en-US" baseline="0" dirty="0" smtClean="0"/>
+              <a:t> </a:t>
+            </a:r>
+            <a:r>
+              <a:rPr lang="en-US" baseline="0" dirty="0" err="1" smtClean="0"/>
+              <a:t>inte</a:t>
+            </a:r>
+            <a:r>
+              <a:rPr lang="en-US" baseline="0" dirty="0" smtClean="0"/>
+              <a:t> </a:t>
+            </a:r>
+            <a:r>
+              <a:rPr lang="en-US" baseline="0" dirty="0" err="1" smtClean="0"/>
+              <a:t>gör</a:t>
+            </a:r>
+            <a:r>
+              <a:rPr lang="en-US" baseline="0" dirty="0" smtClean="0"/>
+              <a:t> </a:t>
+            </a:r>
+            <a:r>
+              <a:rPr lang="en-US" baseline="0" dirty="0" err="1" smtClean="0"/>
+              <a:t>några</a:t>
+            </a:r>
+            <a:r>
+              <a:rPr lang="en-US" baseline="0" dirty="0" smtClean="0"/>
+              <a:t> </a:t>
+            </a:r>
+            <a:r>
+              <a:rPr lang="en-US" baseline="0" dirty="0" err="1" smtClean="0"/>
+              <a:t>externa</a:t>
+            </a:r>
+            <a:r>
+              <a:rPr lang="en-US" baseline="0" dirty="0" smtClean="0"/>
+              <a:t> requests </a:t>
+            </a:r>
+            <a:r>
+              <a:rPr lang="en-US" baseline="0" dirty="0" err="1" smtClean="0"/>
+              <a:t>där</a:t>
+            </a:r>
+            <a:r>
+              <a:rPr lang="en-US" baseline="0" dirty="0" smtClean="0"/>
+              <a:t> </a:t>
+            </a:r>
+            <a:r>
+              <a:rPr lang="en-US" baseline="0" dirty="0" err="1" smtClean="0"/>
+              <a:t>resultatet</a:t>
+            </a:r>
+            <a:r>
+              <a:rPr lang="en-US" baseline="0" dirty="0" smtClean="0"/>
+              <a:t> </a:t>
+            </a:r>
+            <a:r>
+              <a:rPr lang="en-US" baseline="0" dirty="0" err="1" smtClean="0"/>
+              <a:t>påverkas</a:t>
+            </a:r>
+            <a:r>
+              <a:rPr lang="en-US" baseline="0" dirty="0" smtClean="0"/>
+              <a:t> </a:t>
+            </a:r>
+            <a:r>
+              <a:rPr lang="en-US" baseline="0" dirty="0" err="1" smtClean="0"/>
+              <a:t>av</a:t>
+            </a:r>
+            <a:r>
+              <a:rPr lang="en-US" baseline="0" dirty="0" smtClean="0"/>
+              <a:t> </a:t>
+            </a:r>
+            <a:r>
+              <a:rPr lang="en-US" baseline="0" dirty="0" err="1" smtClean="0"/>
+              <a:t>när</a:t>
+            </a:r>
+            <a:r>
+              <a:rPr lang="en-US" baseline="0" dirty="0" smtClean="0"/>
+              <a:t> </a:t>
+            </a:r>
+            <a:r>
+              <a:rPr lang="en-US" baseline="0" dirty="0" err="1" smtClean="0"/>
+              <a:t>requestet</a:t>
+            </a:r>
+            <a:r>
+              <a:rPr lang="en-US" baseline="0" dirty="0" smtClean="0"/>
+              <a:t> </a:t>
+            </a:r>
+            <a:r>
+              <a:rPr lang="en-US" baseline="0" dirty="0" err="1" smtClean="0"/>
+              <a:t>gjordes</a:t>
+            </a:r>
+            <a:r>
+              <a:rPr lang="en-US" baseline="0" dirty="0" smtClean="0"/>
+              <a:t>. Vi </a:t>
+            </a:r>
+            <a:r>
+              <a:rPr lang="en-US" baseline="0" dirty="0" err="1" smtClean="0"/>
+              <a:t>antar</a:t>
+            </a:r>
+            <a:r>
+              <a:rPr lang="en-US" baseline="0" dirty="0" smtClean="0"/>
+              <a:t> </a:t>
+            </a:r>
+            <a:r>
+              <a:rPr lang="en-US" baseline="0" dirty="0" err="1" smtClean="0"/>
+              <a:t>alltså</a:t>
+            </a:r>
+            <a:r>
+              <a:rPr lang="en-US" baseline="0" dirty="0" smtClean="0"/>
+              <a:t> </a:t>
+            </a:r>
+            <a:r>
+              <a:rPr lang="en-US" baseline="0" dirty="0" err="1" smtClean="0"/>
+              <a:t>deterministiska</a:t>
+            </a:r>
+            <a:r>
+              <a:rPr lang="en-US" baseline="0" dirty="0" smtClean="0"/>
+              <a:t> </a:t>
+            </a:r>
+            <a:r>
+              <a:rPr lang="en-US" baseline="0" dirty="0" err="1" smtClean="0"/>
+              <a:t>beräkningar</a:t>
+            </a:r>
+            <a:r>
+              <a:rPr lang="en-US" baseline="0" dirty="0" smtClean="0"/>
+              <a:t> </a:t>
+            </a:r>
+            <a:r>
+              <a:rPr lang="en-US" baseline="0" dirty="0" err="1" smtClean="0"/>
+              <a:t>av</a:t>
+            </a:r>
+            <a:r>
+              <a:rPr lang="en-US" baseline="0" dirty="0" smtClean="0"/>
+              <a:t> </a:t>
+            </a:r>
+            <a:r>
+              <a:rPr lang="en-US" baseline="0" dirty="0" err="1" smtClean="0"/>
+              <a:t>inputen</a:t>
+            </a:r>
+            <a:r>
+              <a:rPr lang="en-US" baseline="0" dirty="0" smtClean="0"/>
+              <a:t>, </a:t>
+            </a:r>
+            <a:r>
+              <a:rPr lang="en-US" baseline="0" dirty="0" err="1" smtClean="0"/>
+              <a:t>så</a:t>
+            </a:r>
+            <a:r>
+              <a:rPr lang="en-US" baseline="0" dirty="0" smtClean="0"/>
+              <a:t> </a:t>
+            </a:r>
+            <a:r>
+              <a:rPr lang="en-US" baseline="0" dirty="0" err="1" smtClean="0"/>
+              <a:t>att</a:t>
+            </a:r>
+            <a:r>
+              <a:rPr lang="en-US" baseline="0" dirty="0" smtClean="0"/>
+              <a:t> </a:t>
+            </a:r>
+            <a:r>
+              <a:rPr lang="en-US" baseline="0" dirty="0" err="1" smtClean="0"/>
+              <a:t>förutsatt</a:t>
+            </a:r>
+            <a:r>
+              <a:rPr lang="en-US" baseline="0" dirty="0" smtClean="0"/>
+              <a:t> </a:t>
+            </a:r>
+            <a:r>
+              <a:rPr lang="en-US" baseline="0" dirty="0" err="1" smtClean="0"/>
+              <a:t>att</a:t>
+            </a:r>
+            <a:r>
+              <a:rPr lang="en-US" baseline="0" dirty="0" smtClean="0"/>
+              <a:t> </a:t>
+            </a:r>
+            <a:r>
+              <a:rPr lang="en-US" baseline="0" dirty="0" err="1" smtClean="0"/>
+              <a:t>alla</a:t>
+            </a:r>
+            <a:r>
+              <a:rPr lang="en-US" baseline="0" dirty="0" smtClean="0"/>
+              <a:t> </a:t>
+            </a:r>
+            <a:r>
+              <a:rPr lang="en-US" baseline="0" dirty="0" err="1" smtClean="0"/>
+              <a:t>replikor</a:t>
+            </a:r>
+            <a:r>
+              <a:rPr lang="en-US" baseline="0" dirty="0" smtClean="0"/>
+              <a:t> </a:t>
+            </a:r>
+            <a:r>
+              <a:rPr lang="en-US" baseline="0" dirty="0" err="1" smtClean="0"/>
+              <a:t>får</a:t>
+            </a:r>
+            <a:r>
+              <a:rPr lang="en-US" baseline="0" dirty="0" smtClean="0"/>
+              <a:t> </a:t>
+            </a:r>
+            <a:r>
+              <a:rPr lang="en-US" baseline="0" dirty="0" err="1" smtClean="0"/>
+              <a:t>samma</a:t>
+            </a:r>
+            <a:r>
+              <a:rPr lang="en-US" baseline="0" dirty="0" smtClean="0"/>
+              <a:t> input, </a:t>
+            </a:r>
+            <a:r>
+              <a:rPr lang="en-US" baseline="0" dirty="0" err="1" smtClean="0"/>
+              <a:t>så</a:t>
+            </a:r>
+            <a:r>
+              <a:rPr lang="en-US" baseline="0" dirty="0" smtClean="0"/>
+              <a:t> </a:t>
+            </a:r>
+            <a:r>
+              <a:rPr lang="en-US" baseline="0" dirty="0" err="1" smtClean="0"/>
+              <a:t>kommer</a:t>
+            </a:r>
+            <a:r>
+              <a:rPr lang="en-US" baseline="0" dirty="0" smtClean="0"/>
+              <a:t> de </a:t>
+            </a:r>
+            <a:r>
+              <a:rPr lang="en-US" baseline="0" dirty="0" err="1" smtClean="0"/>
+              <a:t>även</a:t>
+            </a:r>
+            <a:r>
+              <a:rPr lang="en-US" baseline="0" dirty="0" smtClean="0"/>
+              <a:t> </a:t>
+            </a:r>
+            <a:r>
+              <a:rPr lang="en-US" baseline="0" dirty="0" err="1" smtClean="0"/>
+              <a:t>att</a:t>
+            </a:r>
+            <a:r>
+              <a:rPr lang="en-US" baseline="0" dirty="0" smtClean="0"/>
+              <a:t> </a:t>
+            </a:r>
+            <a:r>
+              <a:rPr lang="en-US" baseline="0" dirty="0" err="1" smtClean="0"/>
+              <a:t>producera</a:t>
+            </a:r>
+            <a:r>
+              <a:rPr lang="en-US" baseline="0" dirty="0" smtClean="0"/>
+              <a:t> </a:t>
+            </a:r>
+            <a:r>
+              <a:rPr lang="en-US" baseline="0" dirty="0" err="1" smtClean="0"/>
+              <a:t>samma</a:t>
+            </a:r>
+            <a:r>
+              <a:rPr lang="en-US" baseline="0" dirty="0" smtClean="0"/>
+              <a:t> </a:t>
+            </a:r>
+            <a:r>
+              <a:rPr lang="en-US" baseline="0" dirty="0" err="1" smtClean="0"/>
+              <a:t>resultat</a:t>
+            </a:r>
+            <a:r>
+              <a:rPr lang="en-US" baseline="0" smtClean="0"/>
+              <a:t>.</a:t>
+            </a:r>
+            <a:endParaRPr lang="en-US"/>
+          </a:p>
+        </p:txBody>
+      </p:sp>
+      <p:sp>
+        <p:nvSpPr>
+          <p:cNvPr id="4" name="Slide Number Placeholder 3"/>
+          <p:cNvSpPr>
+            <a:spLocks noGrp="1"/>
+          </p:cNvSpPr>
+          <p:nvPr>
+            <p:ph type="sldNum" sz="quarter" idx="10"/>
+          </p:nvPr>
+        </p:nvSpPr>
+        <p:spPr/>
+        <p:txBody>
+          <a:bodyPr/>
+          <a:lstStyle/>
+          <a:p>
+            <a:fld id="{100650DF-8CBF-0341-B1F9-47D0C0CD302F}" type="slidenum">
+              <a:rPr lang="en-US" smtClean="0"/>
+              <a:t>7</a:t>
+            </a:fld>
+            <a:endParaRPr lang="en-US"/>
+          </a:p>
+        </p:txBody>
+      </p:sp>
+    </p:spTree>
+    <p:extLst>
+      <p:ext uri="{BB962C8B-B14F-4D97-AF65-F5344CB8AC3E}">
+        <p14:creationId xmlns:p14="http://schemas.microsoft.com/office/powerpoint/2010/main" val="981434626"/>
       </p:ext>
     </p:extLst>
   </p:cSld>
@@ -20308,7 +21277,7 @@
           <p:nvPr/>
         </p:nvPicPr>
         <p:blipFill>
-          <a:blip r:embed="rId2">
+          <a:blip r:embed="rId3">
             <a:extLst>
               <a:ext uri="{28A0092B-C50C-407E-A947-70E740481C1C}">
                 <a14:useLocalDpi xmlns:a14="http://schemas.microsoft.com/office/drawing/2010/main" val="0"/>

</xml_diff>